<commit_message>
Ejemplo de evaluación de accesibilidad de app
</commit_message>
<xml_diff>
--- a/apps/Accesibilidad apps aplicando RD 1112 2018.pptx
+++ b/apps/Accesibilidad apps aplicando RD 1112 2018.pptx
@@ -6,7 +6,7 @@
     <p:sldMasterId id="2147483662" r:id="rId2"/>
   </p:sldMasterIdLst>
   <p:notesMasterIdLst>
-    <p:notesMasterId r:id="rId45"/>
+    <p:notesMasterId r:id="rId44"/>
   </p:notesMasterIdLst>
   <p:sldIdLst>
     <p:sldId id="314" r:id="rId3"/>
@@ -31,26 +31,25 @@
     <p:sldId id="418" r:id="rId22"/>
     <p:sldId id="421" r:id="rId23"/>
     <p:sldId id="423" r:id="rId24"/>
-    <p:sldId id="422" r:id="rId25"/>
-    <p:sldId id="490" r:id="rId26"/>
-    <p:sldId id="424" r:id="rId27"/>
-    <p:sldId id="425" r:id="rId28"/>
-    <p:sldId id="426" r:id="rId29"/>
-    <p:sldId id="427" r:id="rId30"/>
-    <p:sldId id="491" r:id="rId31"/>
-    <p:sldId id="428" r:id="rId32"/>
-    <p:sldId id="429" r:id="rId33"/>
-    <p:sldId id="430" r:id="rId34"/>
-    <p:sldId id="431" r:id="rId35"/>
-    <p:sldId id="432" r:id="rId36"/>
-    <p:sldId id="433" r:id="rId37"/>
-    <p:sldId id="434" r:id="rId38"/>
-    <p:sldId id="488" r:id="rId39"/>
-    <p:sldId id="417" r:id="rId40"/>
-    <p:sldId id="435" r:id="rId41"/>
-    <p:sldId id="489" r:id="rId42"/>
-    <p:sldId id="437" r:id="rId43"/>
-    <p:sldId id="452" r:id="rId44"/>
+    <p:sldId id="490" r:id="rId25"/>
+    <p:sldId id="424" r:id="rId26"/>
+    <p:sldId id="425" r:id="rId27"/>
+    <p:sldId id="426" r:id="rId28"/>
+    <p:sldId id="427" r:id="rId29"/>
+    <p:sldId id="491" r:id="rId30"/>
+    <p:sldId id="428" r:id="rId31"/>
+    <p:sldId id="429" r:id="rId32"/>
+    <p:sldId id="430" r:id="rId33"/>
+    <p:sldId id="431" r:id="rId34"/>
+    <p:sldId id="432" r:id="rId35"/>
+    <p:sldId id="433" r:id="rId36"/>
+    <p:sldId id="434" r:id="rId37"/>
+    <p:sldId id="488" r:id="rId38"/>
+    <p:sldId id="417" r:id="rId39"/>
+    <p:sldId id="435" r:id="rId40"/>
+    <p:sldId id="489" r:id="rId41"/>
+    <p:sldId id="437" r:id="rId42"/>
+    <p:sldId id="452" r:id="rId43"/>
   </p:sldIdLst>
   <p:sldSz cx="12192000" cy="6858000"/>
   <p:notesSz cx="6858000" cy="9144000"/>
@@ -239,7 +238,7 @@
           <a:p>
             <a:fld id="{DF6FEF4D-0142-46B4-AC7F-5B868160AD8E}" type="datetimeFigureOut">
               <a:rPr lang="es-ES" smtClean="0"/>
-              <a:t>15/10/2019</a:t>
+              <a:t>24/10/2019</a:t>
             </a:fld>
             <a:endParaRPr lang="es-ES" dirty="0"/>
           </a:p>
@@ -917,7 +916,7 @@
           <a:p>
             <a:fld id="{9290BFDE-1D6E-4E03-A53A-F1B29D2D0A86}" type="datetime1">
               <a:rPr lang="es-ES" smtClean="0"/>
-              <a:t>15/10/2019</a:t>
+              <a:t>24/10/2019</a:t>
             </a:fld>
             <a:endParaRPr lang="es-ES" dirty="0"/>
           </a:p>
@@ -1087,7 +1086,7 @@
           <a:p>
             <a:fld id="{A02143F0-BAC6-4443-92A3-9EA2CC19B9B7}" type="datetime1">
               <a:rPr lang="es-ES" smtClean="0"/>
-              <a:t>15/10/2019</a:t>
+              <a:t>24/10/2019</a:t>
             </a:fld>
             <a:endParaRPr lang="es-ES" dirty="0"/>
           </a:p>
@@ -1267,7 +1266,7 @@
           <a:p>
             <a:fld id="{9A67633C-AB28-4AC7-B7B0-41DFBCF1B247}" type="datetime1">
               <a:rPr lang="es-ES" smtClean="0"/>
-              <a:t>15/10/2019</a:t>
+              <a:t>24/10/2019</a:t>
             </a:fld>
             <a:endParaRPr lang="es-ES" dirty="0"/>
           </a:p>
@@ -1459,7 +1458,7 @@
           <a:p>
             <a:fld id="{960B338E-2CA8-4990-93F8-04B6F142715C}" type="datetimeFigureOut">
               <a:rPr lang="es-ES" smtClean="0"/>
-              <a:t>15/10/2019</a:t>
+              <a:t>24/10/2019</a:t>
             </a:fld>
             <a:endParaRPr lang="es-ES"/>
           </a:p>
@@ -1629,7 +1628,7 @@
           <a:p>
             <a:fld id="{960B338E-2CA8-4990-93F8-04B6F142715C}" type="datetimeFigureOut">
               <a:rPr lang="es-ES" smtClean="0"/>
-              <a:t>15/10/2019</a:t>
+              <a:t>24/10/2019</a:t>
             </a:fld>
             <a:endParaRPr lang="es-ES"/>
           </a:p>
@@ -1875,7 +1874,7 @@
           <a:p>
             <a:fld id="{960B338E-2CA8-4990-93F8-04B6F142715C}" type="datetimeFigureOut">
               <a:rPr lang="es-ES" smtClean="0"/>
-              <a:t>15/10/2019</a:t>
+              <a:t>24/10/2019</a:t>
             </a:fld>
             <a:endParaRPr lang="es-ES"/>
           </a:p>
@@ -2107,7 +2106,7 @@
           <a:p>
             <a:fld id="{960B338E-2CA8-4990-93F8-04B6F142715C}" type="datetimeFigureOut">
               <a:rPr lang="es-ES" smtClean="0"/>
-              <a:t>15/10/2019</a:t>
+              <a:t>24/10/2019</a:t>
             </a:fld>
             <a:endParaRPr lang="es-ES"/>
           </a:p>
@@ -2474,7 +2473,7 @@
           <a:p>
             <a:fld id="{960B338E-2CA8-4990-93F8-04B6F142715C}" type="datetimeFigureOut">
               <a:rPr lang="es-ES" smtClean="0"/>
-              <a:t>15/10/2019</a:t>
+              <a:t>24/10/2019</a:t>
             </a:fld>
             <a:endParaRPr lang="es-ES"/>
           </a:p>
@@ -2592,7 +2591,7 @@
           <a:p>
             <a:fld id="{960B338E-2CA8-4990-93F8-04B6F142715C}" type="datetimeFigureOut">
               <a:rPr lang="es-ES" smtClean="0"/>
-              <a:t>15/10/2019</a:t>
+              <a:t>24/10/2019</a:t>
             </a:fld>
             <a:endParaRPr lang="es-ES"/>
           </a:p>
@@ -2687,7 +2686,7 @@
           <a:p>
             <a:fld id="{960B338E-2CA8-4990-93F8-04B6F142715C}" type="datetimeFigureOut">
               <a:rPr lang="es-ES" smtClean="0"/>
-              <a:t>15/10/2019</a:t>
+              <a:t>24/10/2019</a:t>
             </a:fld>
             <a:endParaRPr lang="es-ES"/>
           </a:p>
@@ -2900,7 +2899,7 @@
           <a:p>
             <a:fld id="{29A70EA5-8E19-4BC4-934C-2C82A50D6490}" type="datetime1">
               <a:rPr lang="es-ES" smtClean="0"/>
-              <a:t>15/10/2019</a:t>
+              <a:t>24/10/2019</a:t>
             </a:fld>
             <a:endParaRPr lang="es-ES" dirty="0"/>
           </a:p>
@@ -3182,7 +3181,7 @@
           <a:p>
             <a:fld id="{960B338E-2CA8-4990-93F8-04B6F142715C}" type="datetimeFigureOut">
               <a:rPr lang="es-ES" smtClean="0"/>
-              <a:t>15/10/2019</a:t>
+              <a:t>24/10/2019</a:t>
             </a:fld>
             <a:endParaRPr lang="es-ES"/>
           </a:p>
@@ -3435,7 +3434,7 @@
           <a:p>
             <a:fld id="{960B338E-2CA8-4990-93F8-04B6F142715C}" type="datetimeFigureOut">
               <a:rPr lang="es-ES" smtClean="0"/>
-              <a:t>15/10/2019</a:t>
+              <a:t>24/10/2019</a:t>
             </a:fld>
             <a:endParaRPr lang="es-ES"/>
           </a:p>
@@ -3605,7 +3604,7 @@
           <a:p>
             <a:fld id="{960B338E-2CA8-4990-93F8-04B6F142715C}" type="datetimeFigureOut">
               <a:rPr lang="es-ES" smtClean="0"/>
-              <a:t>15/10/2019</a:t>
+              <a:t>24/10/2019</a:t>
             </a:fld>
             <a:endParaRPr lang="es-ES"/>
           </a:p>
@@ -3785,7 +3784,7 @@
           <a:p>
             <a:fld id="{960B338E-2CA8-4990-93F8-04B6F142715C}" type="datetimeFigureOut">
               <a:rPr lang="es-ES" smtClean="0"/>
-              <a:t>15/10/2019</a:t>
+              <a:t>24/10/2019</a:t>
             </a:fld>
             <a:endParaRPr lang="es-ES"/>
           </a:p>
@@ -3998,7 +3997,7 @@
           <a:p>
             <a:fld id="{29A70EA5-8E19-4BC4-934C-2C82A50D6490}" type="datetime1">
               <a:rPr lang="es-ES" smtClean="0"/>
-              <a:t>15/10/2019</a:t>
+              <a:t>24/10/2019</a:t>
             </a:fld>
             <a:endParaRPr lang="es-ES" dirty="0"/>
           </a:p>
@@ -4235,7 +4234,7 @@
           <a:p>
             <a:fld id="{A36C9D08-3C16-416B-B8F9-4D4A629F38C9}" type="datetime1">
               <a:rPr lang="es-ES" smtClean="0"/>
-              <a:t>15/10/2019</a:t>
+              <a:t>24/10/2019</a:t>
             </a:fld>
             <a:endParaRPr lang="es-ES" dirty="0"/>
           </a:p>
@@ -4602,7 +4601,7 @@
           <a:p>
             <a:fld id="{69E1E605-5CBB-40FE-87B4-05B62A5CAB7C}" type="datetime1">
               <a:rPr lang="es-ES" smtClean="0"/>
-              <a:t>15/10/2019</a:t>
+              <a:t>24/10/2019</a:t>
             </a:fld>
             <a:endParaRPr lang="es-ES" dirty="0"/>
           </a:p>
@@ -4720,7 +4719,7 @@
           <a:p>
             <a:fld id="{5EC06281-1CDF-413F-B502-D8EF9109D251}" type="datetime1">
               <a:rPr lang="es-ES" smtClean="0"/>
-              <a:t>15/10/2019</a:t>
+              <a:t>24/10/2019</a:t>
             </a:fld>
             <a:endParaRPr lang="es-ES" dirty="0"/>
           </a:p>
@@ -4838,7 +4837,7 @@
           <a:p>
             <a:fld id="{82C46C39-2265-4ECA-84D0-AFE501AC4C1C}" type="datetime1">
               <a:rPr lang="es-ES" smtClean="0"/>
-              <a:t>15/10/2019</a:t>
+              <a:t>24/10/2019</a:t>
             </a:fld>
             <a:endParaRPr lang="es-ES" dirty="0"/>
           </a:p>
@@ -4933,7 +4932,7 @@
           <a:p>
             <a:fld id="{350D3683-7933-4D92-B730-4B8490CCDF4B}" type="datetime1">
               <a:rPr lang="es-ES" smtClean="0"/>
-              <a:t>15/10/2019</a:t>
+              <a:t>24/10/2019</a:t>
             </a:fld>
             <a:endParaRPr lang="es-ES" dirty="0"/>
           </a:p>
@@ -5210,7 +5209,7 @@
           <a:p>
             <a:fld id="{5C35D45B-6432-4BD4-BB2B-6E8E1493A879}" type="datetime1">
               <a:rPr lang="es-ES" smtClean="0"/>
-              <a:t>15/10/2019</a:t>
+              <a:t>24/10/2019</a:t>
             </a:fld>
             <a:endParaRPr lang="es-ES" dirty="0"/>
           </a:p>
@@ -5423,7 +5422,7 @@
           <a:p>
             <a:fld id="{82C46C39-2265-4ECA-84D0-AFE501AC4C1C}" type="datetime1">
               <a:rPr lang="es-ES" smtClean="0"/>
-              <a:t>15/10/2019</a:t>
+              <a:t>24/10/2019</a:t>
             </a:fld>
             <a:endParaRPr lang="es-ES" dirty="0"/>
           </a:p>
@@ -5965,7 +5964,7 @@
           <a:p>
             <a:fld id="{960B338E-2CA8-4990-93F8-04B6F142715C}" type="datetimeFigureOut">
               <a:rPr lang="es-ES" smtClean="0"/>
-              <a:t>15/10/2019</a:t>
+              <a:t>24/10/2019</a:t>
             </a:fld>
             <a:endParaRPr lang="es-ES"/>
           </a:p>
@@ -6446,6 +6445,10 @@
             </a:br>
             <a:r>
               <a:rPr lang="en-US" sz="2000" dirty="0"/>
+              <a:t>jose.hilera@uah.es</a:t>
+            </a:r>
+            <a:r>
+              <a:rPr lang="en-US" sz="2000" dirty="0"/>
               <a:t/>
             </a:r>
             <a:br>
@@ -6605,7 +6608,12 @@
             <p:ph idx="1"/>
           </p:nvPr>
         </p:nvSpPr>
-        <p:spPr/>
+        <p:spPr>
+          <a:xfrm>
+            <a:off x="527538" y="1491517"/>
+            <a:ext cx="11025553" cy="5127944"/>
+          </a:xfrm>
+        </p:spPr>
         <p:txBody>
           <a:bodyPr>
             <a:normAutofit fontScale="70000" lnSpcReduction="20000"/>
@@ -6764,8 +6772,22 @@
             </a:r>
             <a:r>
               <a:rPr lang="es-ES" dirty="0" smtClean="0"/>
-              <a:t>.</a:t>
-            </a:r>
+              <a:t>. </a:t>
+            </a:r>
+          </a:p>
+          <a:p>
+            <a:pPr lvl="1"/>
+            <a:r>
+              <a:rPr lang="es-ES" i="1" dirty="0" smtClean="0"/>
+              <a:t>La metodología europea se publicó en 2018, como </a:t>
+            </a:r>
+            <a:r>
+              <a:rPr lang="es-ES" i="1" dirty="0" smtClean="0">
+                <a:hlinkClick r:id="rId2"/>
+              </a:rPr>
+              <a:t>Decisión de Ejecución (UE) 2018/1524</a:t>
+            </a:r>
+            <a:endParaRPr lang="es-ES" dirty="0" smtClean="0"/>
           </a:p>
           <a:p>
             <a:r>
@@ -6794,7 +6816,7 @@
             </a:r>
             <a:r>
               <a:rPr lang="es-ES" dirty="0">
-                <a:hlinkClick r:id="rId2"/>
+                <a:hlinkClick r:id="rId3"/>
               </a:rPr>
               <a:t>ENAC</a:t>
             </a:r>
@@ -7206,14 +7228,16 @@
       </p:sp>
       <p:pic>
         <p:nvPicPr>
-          <p:cNvPr id="5" name="Imagen 4" title="&quot;&quot;"/>
+          <p:cNvPr id="5" name="Imagen 4" title="Norm UNE 301549">
+            <a:hlinkClick r:id="rId2"/>
+          </p:cNvPr>
           <p:cNvPicPr>
             <a:picLocks noChangeAspect="1"/>
           </p:cNvPicPr>
           <p:nvPr/>
         </p:nvPicPr>
         <p:blipFill>
-          <a:blip r:embed="rId2" cstate="print">
+          <a:blip r:embed="rId3" cstate="print">
             <a:extLst>
               <a:ext uri="{28A0092B-C50C-407E-A947-70E740481C1C}">
                 <a14:useLocalDpi xmlns:a14="http://schemas.microsoft.com/office/drawing/2010/main" val="0"/>
@@ -7244,14 +7268,16 @@
       </p:pic>
       <p:pic>
         <p:nvPicPr>
-          <p:cNvPr id="6" name="Imagen 5" title="&quot;&quot;"/>
+          <p:cNvPr id="6" name="Imagen 5" title="Estándar EN 301549">
+            <a:hlinkClick r:id="rId4"/>
+          </p:cNvPr>
           <p:cNvPicPr>
             <a:picLocks noChangeAspect="1"/>
           </p:cNvPicPr>
           <p:nvPr/>
         </p:nvPicPr>
         <p:blipFill>
-          <a:blip r:embed="rId3">
+          <a:blip r:embed="rId5">
             <a:extLst>
               <a:ext uri="{28A0092B-C50C-407E-A947-70E740481C1C}">
                 <a14:useLocalDpi xmlns:a14="http://schemas.microsoft.com/office/drawing/2010/main" val="0"/>
@@ -7608,7 +7634,12 @@
             <p:ph idx="1"/>
           </p:nvPr>
         </p:nvSpPr>
-        <p:spPr/>
+        <p:spPr>
+          <a:xfrm>
+            <a:off x="527538" y="1491516"/>
+            <a:ext cx="11025553" cy="5366483"/>
+          </a:xfrm>
+        </p:spPr>
         <p:txBody>
           <a:bodyPr>
             <a:normAutofit fontScale="70000" lnSpcReduction="20000"/>
@@ -7780,10 +7811,23 @@
               <a:t>europeo (</a:t>
             </a:r>
             <a:r>
-              <a:rPr lang="es-ES" dirty="0" smtClean="0"/>
-              <a:t>Decisión de Ejecución UE 2018/1523)</a:t>
-            </a:r>
-            <a:endParaRPr lang="es-ES" dirty="0"/>
+              <a:rPr lang="es-ES" dirty="0" smtClean="0">
+                <a:hlinkClick r:id="rId2"/>
+              </a:rPr>
+              <a:t>Decisión de Ejecución UE 2018/1523</a:t>
+            </a:r>
+            <a:r>
+              <a:rPr lang="es-ES" dirty="0" smtClean="0"/>
+              <a:t>)</a:t>
+            </a:r>
+          </a:p>
+          <a:p>
+            <a:pPr lvl="1"/>
+            <a:r>
+              <a:rPr lang="es-ES" i="1" dirty="0" smtClean="0"/>
+              <a:t>A partir del 23 de junio de 2021 será obligatorio el modelo de declaración europeo   </a:t>
+            </a:r>
+            <a:endParaRPr lang="es-ES" i="1" dirty="0"/>
           </a:p>
           <a:p>
             <a:endParaRPr lang="es-ES" dirty="0"/>
@@ -9054,8 +9098,17 @@
             </a:pPr>
             <a:r>
               <a:rPr lang="es-ES" dirty="0" smtClean="0"/>
-              <a:t>Métodos de seguimiento</a:t>
-            </a:r>
+              <a:t>Método </a:t>
+            </a:r>
+            <a:r>
+              <a:rPr lang="es-ES" dirty="0" smtClean="0"/>
+              <a:t>de </a:t>
+            </a:r>
+            <a:r>
+              <a:rPr lang="es-ES" dirty="0" smtClean="0"/>
+              <a:t>seguimiento en profundidad</a:t>
+            </a:r>
+            <a:endParaRPr lang="es-ES" dirty="0" smtClean="0"/>
           </a:p>
           <a:p>
             <a:pPr marL="514350" indent="-514350">
@@ -9398,7 +9451,19 @@
           <a:p>
             <a:r>
               <a:rPr lang="es-ES" dirty="0" smtClean="0"/>
-              <a:t>7.1 Métodos de seguimiento</a:t>
+              <a:t>7.1 </a:t>
+            </a:r>
+            <a:r>
+              <a:rPr lang="es-ES" dirty="0" smtClean="0"/>
+              <a:t>Método </a:t>
+            </a:r>
+            <a:r>
+              <a:rPr lang="es-ES" dirty="0" smtClean="0"/>
+              <a:t>de </a:t>
+            </a:r>
+            <a:r>
+              <a:rPr lang="es-ES" dirty="0" smtClean="0"/>
+              <a:t>seguimiento en profundidad (1/3)</a:t>
             </a:r>
             <a:endParaRPr lang="es-ES" dirty="0"/>
           </a:p>
@@ -9438,62 +9503,63 @@
             </a:r>
             <a:r>
               <a:rPr lang="es-ES" dirty="0" smtClean="0"/>
-              <a:t>móviles empleando:</a:t>
-            </a:r>
-            <a:endParaRPr lang="es-ES" dirty="0"/>
+              <a:t>móviles </a:t>
+            </a:r>
+            <a:r>
+              <a:rPr lang="es-ES" dirty="0" smtClean="0"/>
+              <a:t>empleando un </a:t>
+            </a:r>
+            <a:r>
+              <a:rPr lang="es-ES" b="1" dirty="0"/>
+              <a:t>método de seguimiento en profundidad</a:t>
+            </a:r>
+            <a:r>
+              <a:rPr lang="es-ES" dirty="0"/>
+              <a:t> para verificar la </a:t>
+            </a:r>
+            <a:r>
+              <a:rPr lang="es-ES" dirty="0" smtClean="0"/>
+              <a:t>conformidad;</a:t>
+            </a:r>
           </a:p>
           <a:p>
             <a:pPr marL="514350" indent="-514350">
               <a:buFont typeface="+mj-lt"/>
               <a:buAutoNum type="alphaLcParenR"/>
             </a:pPr>
-            <a:r>
-              <a:rPr lang="es-ES" dirty="0" smtClean="0"/>
+            <a:endParaRPr lang="es-ES" dirty="0" smtClean="0"/>
+          </a:p>
+          <a:p>
+            <a:pPr lvl="1"/>
+            <a:r>
+              <a:rPr lang="es-ES" i="1" dirty="0" smtClean="0"/>
+              <a:t>NOTA: En el </a:t>
+            </a:r>
+            <a:r>
+              <a:rPr lang="es-ES" i="1" dirty="0" smtClean="0"/>
+              <a:t>caso de los sitios web, también se establece </a:t>
+            </a:r>
+            <a:r>
+              <a:rPr lang="es-ES" i="1" dirty="0" smtClean="0"/>
               <a:t>un </a:t>
             </a:r>
             <a:r>
-              <a:rPr lang="es-ES" dirty="0"/>
+              <a:rPr lang="es-ES" i="1" dirty="0"/>
               <a:t>método de seguimiento </a:t>
             </a:r>
             <a:r>
-              <a:rPr lang="es-ES" b="1" dirty="0"/>
-              <a:t>en profundidad</a:t>
-            </a:r>
-            <a:r>
-              <a:rPr lang="es-ES" dirty="0"/>
-              <a:t> para verificar la </a:t>
-            </a:r>
-            <a:r>
-              <a:rPr lang="es-ES" dirty="0" smtClean="0"/>
-              <a:t>conformidad;</a:t>
-            </a:r>
-          </a:p>
-          <a:p>
-            <a:pPr marL="514350" indent="-514350">
-              <a:buFont typeface="+mj-lt"/>
-              <a:buAutoNum type="alphaLcParenR"/>
-            </a:pPr>
-            <a:r>
-              <a:rPr lang="es-ES" dirty="0" smtClean="0"/>
-              <a:t>un </a:t>
-            </a:r>
-            <a:r>
-              <a:rPr lang="es-ES" dirty="0"/>
-              <a:t>método de seguimiento </a:t>
-            </a:r>
-            <a:r>
-              <a:rPr lang="es-ES" b="1" dirty="0"/>
+              <a:rPr lang="es-ES" b="1" i="1" dirty="0"/>
               <a:t>simplificado</a:t>
             </a:r>
             <a:r>
-              <a:rPr lang="es-ES" dirty="0"/>
+              <a:rPr lang="es-ES" i="1" dirty="0"/>
               <a:t> para detectar casos de </a:t>
             </a:r>
             <a:r>
-              <a:rPr lang="es-ES" dirty="0" smtClean="0"/>
-              <a:t>incumplimiento</a:t>
-            </a:r>
-            <a:endParaRPr lang="es-ES" dirty="0"/>
+              <a:rPr lang="es-ES" i="1" dirty="0" smtClean="0"/>
+              <a:t>incumplimiento, pero esto no afecta a las aplicaciones para dispositivos móviles.</a:t>
+            </a:r>
+            <a:endParaRPr lang="es-ES" i="1" dirty="0"/>
           </a:p>
         </p:txBody>
       </p:sp>
@@ -9574,7 +9640,19 @@
           <a:p>
             <a:r>
               <a:rPr lang="es-ES" dirty="0" smtClean="0"/>
-              <a:t>7.1 a) Método de seguimiento en profundidad (1/2)</a:t>
+              <a:t>7.1 </a:t>
+            </a:r>
+            <a:r>
+              <a:rPr lang="es-ES" dirty="0" smtClean="0"/>
+              <a:t>Método </a:t>
+            </a:r>
+            <a:r>
+              <a:rPr lang="es-ES" dirty="0" smtClean="0"/>
+              <a:t>de seguimiento en profundidad </a:t>
+            </a:r>
+            <a:r>
+              <a:rPr lang="es-ES" dirty="0" smtClean="0"/>
+              <a:t>(2/3)</a:t>
             </a:r>
             <a:endParaRPr lang="es-ES" dirty="0"/>
           </a:p>
@@ -9746,7 +9824,15 @@
           <a:p>
             <a:r>
               <a:rPr lang="es-ES" dirty="0" smtClean="0"/>
-              <a:t>7.1 a) Método de seguimiento en profundidad</a:t>
+              <a:t>7.1 </a:t>
+            </a:r>
+            <a:r>
+              <a:rPr lang="es-ES" dirty="0" smtClean="0"/>
+              <a:t>Método </a:t>
+            </a:r>
+            <a:r>
+              <a:rPr lang="es-ES" dirty="0" smtClean="0"/>
+              <a:t>de seguimiento en profundidad</a:t>
             </a:r>
             <a:r>
               <a:rPr lang="es-ES" dirty="0"/>
@@ -9754,7 +9840,7 @@
             </a:r>
             <a:r>
               <a:rPr lang="es-ES" dirty="0" smtClean="0"/>
-              <a:t>(2/2)</a:t>
+              <a:t>(3/3)</a:t>
             </a:r>
             <a:endParaRPr lang="es-ES" dirty="0"/>
           </a:p>
@@ -9984,7 +10070,22 @@
           <a:p>
             <a:r>
               <a:rPr lang="es-ES" dirty="0" smtClean="0"/>
-              <a:t>7.1 b) Método de seguimiento simplificado</a:t>
+              <a:t>7. Seguimiento </a:t>
+            </a:r>
+            <a:r>
+              <a:rPr lang="es-ES" dirty="0"/>
+              <a:t>y presentación de </a:t>
+            </a:r>
+            <a:r>
+              <a:rPr lang="es-ES" dirty="0" smtClean="0"/>
+              <a:t>informes</a:t>
+            </a:r>
+            <a:br>
+              <a:rPr lang="es-ES" dirty="0" smtClean="0"/>
+            </a:br>
+            <a:r>
+              <a:rPr lang="es-ES" dirty="0" smtClean="0"/>
+              <a:t>Decisión (UE) 2018/1524 </a:t>
             </a:r>
             <a:endParaRPr lang="es-ES" dirty="0"/>
           </a:p>
@@ -10003,214 +10104,73 @@
         <p:spPr/>
         <p:txBody>
           <a:bodyPr>
-            <a:normAutofit fontScale="77500" lnSpcReduction="20000"/>
+            <a:normAutofit/>
           </a:bodyPr>
           <a:lstStyle/>
           <a:p>
-            <a:r>
-              <a:rPr lang="es-ES" dirty="0" smtClean="0"/>
-              <a:t>Incluirá </a:t>
-            </a:r>
-            <a:r>
-              <a:rPr lang="es-ES" dirty="0"/>
-              <a:t>pruebas </a:t>
-            </a:r>
-            <a:r>
-              <a:rPr lang="es-ES" dirty="0" smtClean="0"/>
-              <a:t>para buscar </a:t>
-            </a:r>
-            <a:r>
-              <a:rPr lang="es-ES" dirty="0"/>
-              <a:t>casos de incumplimiento</a:t>
-            </a:r>
-            <a:r>
-              <a:rPr lang="es-ES" dirty="0" smtClean="0"/>
-              <a:t>.</a:t>
-            </a:r>
-          </a:p>
-          <a:p>
-            <a:r>
-              <a:rPr lang="es-ES" dirty="0" smtClean="0"/>
-              <a:t>El </a:t>
-            </a:r>
-            <a:r>
-              <a:rPr lang="es-ES" dirty="0"/>
-              <a:t>objetivo </a:t>
-            </a:r>
-            <a:r>
-              <a:rPr lang="es-ES" dirty="0" smtClean="0"/>
-              <a:t>será </a:t>
-            </a:r>
-            <a:r>
-              <a:rPr lang="es-ES" dirty="0"/>
-              <a:t>abarcar, en la mayor medida de lo razonablemente posible con el uso de </a:t>
-            </a:r>
-            <a:r>
-              <a:rPr lang="es-ES" b="1" dirty="0"/>
-              <a:t>pruebas automatizadas</a:t>
-            </a:r>
-            <a:r>
-              <a:rPr lang="es-ES" dirty="0"/>
-              <a:t>, las siguientes necesidades de accesibilidad de los usuarios</a:t>
-            </a:r>
-            <a:r>
-              <a:rPr lang="es-ES" dirty="0" smtClean="0"/>
-              <a:t>:</a:t>
-            </a:r>
-          </a:p>
-          <a:p>
-            <a:pPr marL="914400" lvl="1" indent="-457200">
+            <a:pPr marL="514350" indent="-514350">
               <a:buFont typeface="+mj-lt"/>
-              <a:buAutoNum type="alphaLcParenR"/>
+              <a:buAutoNum type="arabicPeriod"/>
             </a:pPr>
             <a:r>
               <a:rPr lang="es-ES" dirty="0" smtClean="0"/>
-              <a:t>uso </a:t>
-            </a:r>
-            <a:r>
-              <a:rPr lang="es-ES" dirty="0"/>
-              <a:t>sin visión; </a:t>
+              <a:t>Método </a:t>
+            </a:r>
+            <a:r>
+              <a:rPr lang="es-ES" dirty="0" smtClean="0"/>
+              <a:t>de </a:t>
+            </a:r>
+            <a:r>
+              <a:rPr lang="es-ES" dirty="0" smtClean="0"/>
+              <a:t>seguimiento en profundidad</a:t>
             </a:r>
             <a:endParaRPr lang="es-ES" dirty="0" smtClean="0"/>
           </a:p>
           <a:p>
-            <a:pPr marL="914400" lvl="1" indent="-457200">
+            <a:pPr marL="514350" indent="-514350">
               <a:buFont typeface="+mj-lt"/>
-              <a:buAutoNum type="alphaLcParenR"/>
+              <a:buAutoNum type="arabicPeriod"/>
             </a:pPr>
             <a:r>
-              <a:rPr lang="es-ES" dirty="0" smtClean="0"/>
-              <a:t>uso </a:t>
-            </a:r>
-            <a:r>
-              <a:rPr lang="es-ES" dirty="0"/>
-              <a:t>con visión limitada; </a:t>
-            </a:r>
-            <a:endParaRPr lang="es-ES" dirty="0" smtClean="0"/>
-          </a:p>
-          <a:p>
-            <a:pPr marL="914400" lvl="1" indent="-457200">
+              <a:rPr lang="es-ES" dirty="0"/>
+              <a:t>Muestreo de </a:t>
+            </a:r>
+            <a:r>
+              <a:rPr lang="es-ES" dirty="0" smtClean="0"/>
+              <a:t>las </a:t>
+            </a:r>
+            <a:r>
+              <a:rPr lang="es-ES" dirty="0"/>
+              <a:t>aplicaciones para dispositivos </a:t>
+            </a:r>
+            <a:r>
+              <a:rPr lang="es-ES" dirty="0" smtClean="0"/>
+              <a:t>móviles</a:t>
+            </a:r>
+          </a:p>
+          <a:p>
+            <a:pPr marL="514350" indent="-514350">
               <a:buFont typeface="+mj-lt"/>
-              <a:buAutoNum type="alphaLcParenR"/>
+              <a:buAutoNum type="arabicPeriod"/>
             </a:pPr>
             <a:r>
               <a:rPr lang="es-ES" dirty="0" smtClean="0"/>
-              <a:t>uso </a:t>
-            </a:r>
-            <a:r>
-              <a:rPr lang="es-ES" dirty="0"/>
-              <a:t>sin percepción de color; </a:t>
-            </a:r>
-            <a:endParaRPr lang="es-ES" dirty="0" smtClean="0"/>
-          </a:p>
-          <a:p>
-            <a:pPr marL="914400" lvl="1" indent="-457200">
-              <a:buFont typeface="+mj-lt"/>
-              <a:buAutoNum type="alphaLcParenR"/>
-            </a:pPr>
-            <a:r>
-              <a:rPr lang="es-ES" dirty="0" smtClean="0"/>
-              <a:t>uso </a:t>
-            </a:r>
-            <a:r>
-              <a:rPr lang="es-ES" dirty="0"/>
-              <a:t>sin audición; </a:t>
-            </a:r>
-            <a:endParaRPr lang="es-ES" dirty="0" smtClean="0"/>
-          </a:p>
-          <a:p>
-            <a:pPr marL="914400" lvl="1" indent="-457200">
-              <a:buFont typeface="+mj-lt"/>
-              <a:buAutoNum type="alphaLcParenR"/>
-            </a:pPr>
-            <a:r>
-              <a:rPr lang="es-ES" dirty="0" smtClean="0"/>
-              <a:t>uso </a:t>
-            </a:r>
-            <a:r>
-              <a:rPr lang="es-ES" dirty="0"/>
-              <a:t>con audición limitada</a:t>
-            </a:r>
-            <a:r>
-              <a:rPr lang="es-ES" dirty="0" smtClean="0"/>
-              <a:t>;</a:t>
-            </a:r>
-          </a:p>
-          <a:p>
-            <a:pPr marL="914400" lvl="1" indent="-457200">
-              <a:buFont typeface="+mj-lt"/>
-              <a:buAutoNum type="alphaLcParenR"/>
-            </a:pPr>
-            <a:r>
-              <a:rPr lang="es-ES" dirty="0" smtClean="0"/>
-              <a:t>uso </a:t>
-            </a:r>
-            <a:r>
-              <a:rPr lang="es-ES" dirty="0"/>
-              <a:t>sin capacidad vocal</a:t>
-            </a:r>
-            <a:r>
-              <a:rPr lang="es-ES" dirty="0" smtClean="0"/>
-              <a:t>;</a:t>
-            </a:r>
-          </a:p>
-          <a:p>
-            <a:pPr marL="914400" lvl="1" indent="-457200">
-              <a:buFont typeface="+mj-lt"/>
-              <a:buAutoNum type="alphaLcParenR"/>
-            </a:pPr>
-            <a:r>
-              <a:rPr lang="es-ES" dirty="0" smtClean="0"/>
-              <a:t>uso </a:t>
-            </a:r>
-            <a:r>
-              <a:rPr lang="es-ES" dirty="0"/>
-              <a:t>con capacidad de manipulación o fuerza limitada; </a:t>
-            </a:r>
-            <a:endParaRPr lang="es-ES" dirty="0" smtClean="0"/>
-          </a:p>
-          <a:p>
-            <a:pPr marL="914400" lvl="1" indent="-457200">
-              <a:buFont typeface="+mj-lt"/>
-              <a:buAutoNum type="alphaLcParenR"/>
-            </a:pPr>
-            <a:r>
-              <a:rPr lang="es-ES" dirty="0"/>
-              <a:t>u</a:t>
-            </a:r>
-            <a:r>
-              <a:rPr lang="es-ES" dirty="0" smtClean="0"/>
-              <a:t>so con riesgo </a:t>
-            </a:r>
-            <a:r>
-              <a:rPr lang="es-ES" dirty="0"/>
-              <a:t>de activación de reacciones fotosensibles</a:t>
-            </a:r>
-            <a:r>
-              <a:rPr lang="es-ES" dirty="0" smtClean="0"/>
-              <a:t>;</a:t>
-            </a:r>
-          </a:p>
-          <a:p>
-            <a:pPr marL="914400" lvl="1" indent="-457200">
-              <a:buFont typeface="+mj-lt"/>
-              <a:buAutoNum type="alphaLcParenR"/>
-            </a:pPr>
-            <a:r>
-              <a:rPr lang="es-ES" dirty="0" smtClean="0"/>
-              <a:t>uso </a:t>
-            </a:r>
-            <a:r>
-              <a:rPr lang="es-ES" dirty="0"/>
-              <a:t>con capacidades cognitivas limitadas.</a:t>
-            </a:r>
-            <a:endParaRPr lang="es-ES" dirty="0" smtClean="0"/>
-          </a:p>
-          <a:p>
-            <a:pPr marL="457200" lvl="1" indent="0">
-              <a:buNone/>
-            </a:pPr>
-            <a:endParaRPr lang="es-ES" dirty="0" smtClean="0"/>
+              <a:t>Informe de seguimiento</a:t>
+            </a:r>
+          </a:p>
+          <a:p>
+            <a:pPr lvl="1"/>
+            <a:r>
+              <a:rPr lang="es-ES" dirty="0" smtClean="0"/>
+              <a:t>Contenido</a:t>
+            </a:r>
+          </a:p>
+          <a:p>
+            <a:pPr lvl="1"/>
+            <a:r>
+              <a:rPr lang="es-ES" dirty="0" smtClean="0"/>
+              <a:t>Frecuencia de presentación</a:t>
+            </a:r>
           </a:p>
         </p:txBody>
       </p:sp>
@@ -10237,10 +10197,50 @@
           </a:p>
         </p:txBody>
       </p:sp>
+      <p:sp>
+        <p:nvSpPr>
+          <p:cNvPr id="6" name="Flecha derecha 5" title="&quot;&quot;"/>
+          <p:cNvSpPr/>
+          <p:nvPr/>
+        </p:nvSpPr>
+        <p:spPr>
+          <a:xfrm>
+            <a:off x="120797" y="2333019"/>
+            <a:ext cx="406741" cy="241216"/>
+          </a:xfrm>
+          <a:prstGeom prst="rightArrow">
+            <a:avLst/>
+          </a:prstGeom>
+        </p:spPr>
+        <p:style>
+          <a:lnRef idx="2">
+            <a:schemeClr val="accent1">
+              <a:shade val="50000"/>
+            </a:schemeClr>
+          </a:lnRef>
+          <a:fillRef idx="1">
+            <a:schemeClr val="accent1"/>
+          </a:fillRef>
+          <a:effectRef idx="0">
+            <a:schemeClr val="accent1"/>
+          </a:effectRef>
+          <a:fontRef idx="minor">
+            <a:schemeClr val="lt1"/>
+          </a:fontRef>
+        </p:style>
+        <p:txBody>
+          <a:bodyPr rtlCol="0" anchor="ctr"/>
+          <a:lstStyle/>
+          <a:p>
+            <a:pPr algn="ctr"/>
+            <a:endParaRPr lang="es-ES"/>
+          </a:p>
+        </p:txBody>
+      </p:sp>
     </p:spTree>
     <p:extLst>
       <p:ext uri="{BB962C8B-B14F-4D97-AF65-F5344CB8AC3E}">
-        <p14:creationId xmlns:p14="http://schemas.microsoft.com/office/powerpoint/2010/main" val="2802246251"/>
+        <p14:creationId xmlns:p14="http://schemas.microsoft.com/office/powerpoint/2010/main" val="3865334732"/>
       </p:ext>
     </p:extLst>
   </p:cSld>
@@ -10286,103 +10286,167 @@
         </p:nvSpPr>
         <p:spPr/>
         <p:txBody>
-          <a:bodyPr/>
-          <a:lstStyle/>
-          <a:p>
-            <a:r>
-              <a:rPr lang="es-ES" dirty="0" smtClean="0"/>
-              <a:t>7. Seguimiento </a:t>
-            </a:r>
-            <a:r>
-              <a:rPr lang="es-ES" dirty="0"/>
-              <a:t>y presentación de </a:t>
-            </a:r>
-            <a:r>
-              <a:rPr lang="es-ES" dirty="0" smtClean="0"/>
-              <a:t>informes</a:t>
-            </a:r>
-            <a:br>
-              <a:rPr lang="es-ES" dirty="0" smtClean="0"/>
-            </a:br>
-            <a:r>
-              <a:rPr lang="es-ES" dirty="0" smtClean="0"/>
-              <a:t>Decisión (UE) 2018/1524 </a:t>
-            </a:r>
-            <a:endParaRPr lang="es-ES" dirty="0"/>
-          </a:p>
-        </p:txBody>
-      </p:sp>
-      <p:sp>
-        <p:nvSpPr>
-          <p:cNvPr id="3" name="Marcador de contenido 2"/>
-          <p:cNvSpPr>
-            <a:spLocks noGrp="1"/>
-          </p:cNvSpPr>
-          <p:nvPr>
-            <p:ph idx="1"/>
-          </p:nvPr>
-        </p:nvSpPr>
-        <p:spPr/>
-        <p:txBody>
           <a:bodyPr>
             <a:normAutofit/>
           </a:bodyPr>
           <a:lstStyle/>
           <a:p>
-            <a:pPr marL="514350" indent="-514350">
-              <a:buFont typeface="+mj-lt"/>
-              <a:buAutoNum type="arabicPeriod"/>
-            </a:pPr>
-            <a:r>
-              <a:rPr lang="es-ES" dirty="0" smtClean="0"/>
-              <a:t>Métodos de seguimiento</a:t>
-            </a:r>
-          </a:p>
-          <a:p>
-            <a:pPr marL="514350" indent="-514350">
-              <a:buFont typeface="+mj-lt"/>
-              <a:buAutoNum type="arabicPeriod"/>
-            </a:pPr>
-            <a:r>
-              <a:rPr lang="es-ES" dirty="0"/>
-              <a:t>Muestreo de </a:t>
-            </a:r>
-            <a:r>
-              <a:rPr lang="es-ES" dirty="0" smtClean="0"/>
-              <a:t>las </a:t>
-            </a:r>
-            <a:r>
-              <a:rPr lang="es-ES" dirty="0"/>
-              <a:t>aplicaciones para dispositivos </a:t>
-            </a:r>
-            <a:r>
-              <a:rPr lang="es-ES" dirty="0" smtClean="0"/>
-              <a:t>móviles</a:t>
-            </a:r>
-          </a:p>
-          <a:p>
-            <a:pPr marL="514350" indent="-514350">
-              <a:buFont typeface="+mj-lt"/>
-              <a:buAutoNum type="arabicPeriod"/>
-            </a:pPr>
-            <a:r>
-              <a:rPr lang="es-ES" dirty="0" smtClean="0"/>
-              <a:t>Informe de seguimiento</a:t>
+            <a:r>
+              <a:rPr lang="es-ES" dirty="0" smtClean="0"/>
+              <a:t>7.2 </a:t>
+            </a:r>
+            <a:r>
+              <a:rPr lang="es-ES" dirty="0"/>
+              <a:t>Muestreo de las </a:t>
+            </a:r>
+            <a:r>
+              <a:rPr lang="es-ES" dirty="0" smtClean="0"/>
+              <a:t>apps</a:t>
+            </a:r>
+            <a:br>
+              <a:rPr lang="es-ES" dirty="0" smtClean="0"/>
+            </a:br>
+            <a:r>
+              <a:rPr lang="es-ES" dirty="0" smtClean="0"/>
+              <a:t>Tamaño de la muestra</a:t>
+            </a:r>
+            <a:endParaRPr lang="es-ES" dirty="0"/>
+          </a:p>
+        </p:txBody>
+      </p:sp>
+      <p:sp>
+        <p:nvSpPr>
+          <p:cNvPr id="3" name="Marcador de contenido 2"/>
+          <p:cNvSpPr>
+            <a:spLocks noGrp="1"/>
+          </p:cNvSpPr>
+          <p:nvPr>
+            <p:ph idx="1"/>
+          </p:nvPr>
+        </p:nvSpPr>
+        <p:spPr/>
+        <p:txBody>
+          <a:bodyPr>
+            <a:normAutofit/>
+          </a:bodyPr>
+          <a:lstStyle/>
+          <a:p>
+            <a:r>
+              <a:rPr lang="es-ES" dirty="0"/>
+              <a:t>El tamaño mínimo de la </a:t>
+            </a:r>
+            <a:r>
+              <a:rPr lang="es-ES" dirty="0" smtClean="0"/>
+              <a:t>muestra será </a:t>
+            </a:r>
+            <a:r>
+              <a:rPr lang="es-ES" dirty="0"/>
+              <a:t>de 1 </a:t>
+            </a:r>
+            <a:r>
+              <a:rPr lang="es-ES" dirty="0" smtClean="0"/>
+              <a:t>app por </a:t>
+            </a:r>
+            <a:r>
+              <a:rPr lang="es-ES" dirty="0"/>
+              <a:t>cada </a:t>
+            </a:r>
+            <a:r>
+              <a:rPr lang="es-ES" dirty="0" smtClean="0"/>
+              <a:t>1.000.000 </a:t>
+            </a:r>
+            <a:r>
+              <a:rPr lang="es-ES" dirty="0"/>
+              <a:t>habitantes, más 6 </a:t>
+            </a:r>
+            <a:r>
+              <a:rPr lang="es-ES" dirty="0" smtClean="0"/>
+              <a:t>apps adicionales. </a:t>
             </a:r>
           </a:p>
           <a:p>
             <a:pPr lvl="1"/>
             <a:r>
               <a:rPr lang="es-ES" dirty="0" smtClean="0"/>
-              <a:t>Contenido</a:t>
+              <a:t>España: 52 apps = 46 apps + 6 apps adicionales</a:t>
+            </a:r>
+          </a:p>
+          <a:p>
+            <a:r>
+              <a:rPr lang="es-ES" dirty="0" smtClean="0"/>
+              <a:t>A </a:t>
+            </a:r>
+            <a:r>
+              <a:rPr lang="es-ES" dirty="0"/>
+              <a:t>partir del segundo período de seguimiento, </a:t>
+            </a:r>
+            <a:r>
+              <a:rPr lang="es-ES" dirty="0" smtClean="0"/>
+              <a:t>la </a:t>
+            </a:r>
+            <a:r>
+              <a:rPr lang="es-ES" dirty="0"/>
+              <a:t>muestra </a:t>
+            </a:r>
+            <a:r>
+              <a:rPr lang="es-ES" dirty="0" smtClean="0"/>
+              <a:t>incluirá, </a:t>
+            </a:r>
+            <a:r>
+              <a:rPr lang="es-ES" dirty="0"/>
+              <a:t>como </a:t>
+            </a:r>
+            <a:r>
+              <a:rPr lang="es-ES" dirty="0" smtClean="0"/>
+              <a:t>mínimo:</a:t>
             </a:r>
           </a:p>
           <a:p>
             <a:pPr lvl="1"/>
             <a:r>
               <a:rPr lang="es-ES" dirty="0" smtClean="0"/>
-              <a:t>Frecuencia de presentación</a:t>
-            </a:r>
+              <a:t>un </a:t>
+            </a:r>
+            <a:r>
+              <a:rPr lang="es-ES" dirty="0"/>
+              <a:t>10 % de </a:t>
+            </a:r>
+            <a:r>
+              <a:rPr lang="es-ES" dirty="0" smtClean="0"/>
+              <a:t>apps que </a:t>
+            </a:r>
+            <a:r>
+              <a:rPr lang="es-ES" dirty="0"/>
+              <a:t>ya hayan sido objeto de seguimiento en el período </a:t>
+            </a:r>
+            <a:r>
+              <a:rPr lang="es-ES" dirty="0" smtClean="0"/>
+              <a:t>anterior (España: min. 5)</a:t>
+            </a:r>
+          </a:p>
+          <a:p>
+            <a:pPr lvl="1"/>
+            <a:r>
+              <a:rPr lang="es-ES" dirty="0" smtClean="0"/>
+              <a:t>un </a:t>
+            </a:r>
+            <a:r>
+              <a:rPr lang="es-ES" dirty="0"/>
+              <a:t>50 % de </a:t>
+            </a:r>
+            <a:r>
+              <a:rPr lang="es-ES" dirty="0" smtClean="0"/>
+              <a:t>apps </a:t>
+            </a:r>
+            <a:r>
+              <a:rPr lang="es-ES" dirty="0"/>
+              <a:t>que no hayan sido objeto de seguimiento en ese </a:t>
+            </a:r>
+            <a:r>
+              <a:rPr lang="es-ES" dirty="0" smtClean="0"/>
+              <a:t>período (España: mín. 26)</a:t>
+            </a:r>
+            <a:endParaRPr lang="es-ES" dirty="0"/>
           </a:p>
         </p:txBody>
       </p:sp>
@@ -10409,50 +10473,10 @@
           </a:p>
         </p:txBody>
       </p:sp>
-      <p:sp>
-        <p:nvSpPr>
-          <p:cNvPr id="6" name="Flecha derecha 5" title="&quot;&quot;"/>
-          <p:cNvSpPr/>
-          <p:nvPr/>
-        </p:nvSpPr>
-        <p:spPr>
-          <a:xfrm>
-            <a:off x="120797" y="2333019"/>
-            <a:ext cx="406741" cy="241216"/>
-          </a:xfrm>
-          <a:prstGeom prst="rightArrow">
-            <a:avLst/>
-          </a:prstGeom>
-        </p:spPr>
-        <p:style>
-          <a:lnRef idx="2">
-            <a:schemeClr val="accent1">
-              <a:shade val="50000"/>
-            </a:schemeClr>
-          </a:lnRef>
-          <a:fillRef idx="1">
-            <a:schemeClr val="accent1"/>
-          </a:fillRef>
-          <a:effectRef idx="0">
-            <a:schemeClr val="accent1"/>
-          </a:effectRef>
-          <a:fontRef idx="minor">
-            <a:schemeClr val="lt1"/>
-          </a:fontRef>
-        </p:style>
-        <p:txBody>
-          <a:bodyPr rtlCol="0" anchor="ctr"/>
-          <a:lstStyle/>
-          <a:p>
-            <a:pPr algn="ctr"/>
-            <a:endParaRPr lang="es-ES"/>
-          </a:p>
-        </p:txBody>
-      </p:sp>
     </p:spTree>
     <p:extLst>
       <p:ext uri="{BB962C8B-B14F-4D97-AF65-F5344CB8AC3E}">
-        <p14:creationId xmlns:p14="http://schemas.microsoft.com/office/powerpoint/2010/main" val="3865334732"/>
+        <p14:creationId xmlns:p14="http://schemas.microsoft.com/office/powerpoint/2010/main" val="2121161257"/>
       </p:ext>
     </p:extLst>
   </p:cSld>
@@ -10520,7 +10544,7 @@
             </a:br>
             <a:r>
               <a:rPr lang="es-ES" dirty="0" smtClean="0"/>
-              <a:t>Tamaño de la muestra</a:t>
+              <a:t>Selección de la muestra</a:t>
             </a:r>
             <a:endParaRPr lang="es-ES" dirty="0"/>
           </a:p>
@@ -10539,126 +10563,145 @@
         <p:spPr/>
         <p:txBody>
           <a:bodyPr>
-            <a:normAutofit/>
+            <a:normAutofit lnSpcReduction="10000"/>
           </a:bodyPr>
           <a:lstStyle/>
           <a:p>
             <a:r>
-              <a:rPr lang="es-ES" dirty="0"/>
-              <a:t>El tamaño mínimo de la </a:t>
-            </a:r>
-            <a:r>
-              <a:rPr lang="es-ES" dirty="0" smtClean="0"/>
-              <a:t>muestra será </a:t>
-            </a:r>
-            <a:r>
-              <a:rPr lang="es-ES" dirty="0"/>
-              <a:t>de 1 </a:t>
-            </a:r>
-            <a:r>
-              <a:rPr lang="es-ES" dirty="0" smtClean="0"/>
-              <a:t>app por </a:t>
-            </a:r>
-            <a:r>
-              <a:rPr lang="es-ES" dirty="0"/>
-              <a:t>cada </a:t>
-            </a:r>
-            <a:r>
-              <a:rPr lang="es-ES" dirty="0" smtClean="0"/>
-              <a:t>1.000.000 </a:t>
-            </a:r>
-            <a:r>
-              <a:rPr lang="es-ES" dirty="0"/>
-              <a:t>habitantes, más 6 </a:t>
-            </a:r>
-            <a:r>
-              <a:rPr lang="es-ES" dirty="0" smtClean="0"/>
-              <a:t>apps adicionales. </a:t>
+              <a:rPr lang="es-ES" dirty="0" smtClean="0"/>
+              <a:t>La </a:t>
+            </a:r>
+            <a:r>
+              <a:rPr lang="es-ES" dirty="0"/>
+              <a:t>muestra </a:t>
+            </a:r>
+            <a:r>
+              <a:rPr lang="es-ES" dirty="0" smtClean="0"/>
+              <a:t>debe ser diversa </a:t>
+            </a:r>
+            <a:r>
+              <a:rPr lang="es-ES" dirty="0"/>
+              <a:t>y representativa. </a:t>
+            </a:r>
+            <a:endParaRPr lang="es-ES" dirty="0" smtClean="0"/>
+          </a:p>
+          <a:p>
+            <a:r>
+              <a:rPr lang="es-ES" dirty="0" smtClean="0"/>
+              <a:t>Se </a:t>
+            </a:r>
+            <a:r>
+              <a:rPr lang="es-ES" dirty="0"/>
+              <a:t>tomarán en </a:t>
+            </a:r>
+            <a:r>
+              <a:rPr lang="es-ES" dirty="0" smtClean="0"/>
+              <a:t>consideración apps descargadas </a:t>
+            </a:r>
+            <a:r>
+              <a:rPr lang="es-ES" dirty="0"/>
+              <a:t>con mayor frecuencia</a:t>
+            </a:r>
+            <a:r>
+              <a:rPr lang="es-ES" dirty="0" smtClean="0"/>
+              <a:t>.</a:t>
+            </a:r>
+          </a:p>
+          <a:p>
+            <a:r>
+              <a:rPr lang="es-ES" dirty="0"/>
+              <a:t>S</a:t>
+            </a:r>
+            <a:r>
+              <a:rPr lang="es-ES" dirty="0" smtClean="0"/>
+              <a:t>e </a:t>
+            </a:r>
+            <a:r>
+              <a:rPr lang="es-ES" dirty="0"/>
+              <a:t>tendrán en cuenta los diferentes sistemas </a:t>
+            </a:r>
+            <a:r>
+              <a:rPr lang="es-ES" dirty="0" smtClean="0"/>
+              <a:t>operativos </a:t>
             </a:r>
           </a:p>
           <a:p>
             <a:pPr lvl="1"/>
             <a:r>
               <a:rPr lang="es-ES" dirty="0" smtClean="0"/>
-              <a:t>España: 52 apps = 46 apps + 6 apps adicionales</a:t>
-            </a:r>
-          </a:p>
-          <a:p>
-            <a:r>
-              <a:rPr lang="es-ES" dirty="0" smtClean="0"/>
-              <a:t>A </a:t>
-            </a:r>
-            <a:r>
-              <a:rPr lang="es-ES" dirty="0"/>
-              <a:t>partir del segundo período de seguimiento, </a:t>
-            </a:r>
-            <a:r>
-              <a:rPr lang="es-ES" dirty="0" smtClean="0"/>
-              <a:t>la </a:t>
-            </a:r>
-            <a:r>
-              <a:rPr lang="es-ES" dirty="0"/>
-              <a:t>muestra </a:t>
-            </a:r>
-            <a:r>
-              <a:rPr lang="es-ES" dirty="0" smtClean="0"/>
-              <a:t>incluirá, </a:t>
-            </a:r>
-            <a:r>
-              <a:rPr lang="es-ES" dirty="0"/>
-              <a:t>como </a:t>
-            </a:r>
-            <a:r>
-              <a:rPr lang="es-ES" dirty="0" smtClean="0"/>
-              <a:t>mínimo:</a:t>
+              <a:t>Las </a:t>
+            </a:r>
+            <a:r>
+              <a:rPr lang="es-ES" dirty="0"/>
+              <a:t>versiones de una </a:t>
+            </a:r>
+            <a:r>
+              <a:rPr lang="es-ES" dirty="0" smtClean="0"/>
+              <a:t>app </a:t>
+            </a:r>
+            <a:r>
+              <a:rPr lang="es-ES" dirty="0"/>
+              <a:t>para diferentes sistemas operativos se considerarán </a:t>
+            </a:r>
+            <a:r>
+              <a:rPr lang="es-ES" dirty="0" smtClean="0"/>
+              <a:t>apps distintas.</a:t>
+            </a:r>
+          </a:p>
+          <a:p>
+            <a:r>
+              <a:rPr lang="es-ES" dirty="0"/>
+              <a:t>Solo se incluirá en la muestra la versión más reciente de una </a:t>
+            </a:r>
+            <a:r>
+              <a:rPr lang="es-ES" dirty="0" smtClean="0"/>
+              <a:t>app</a:t>
             </a:r>
           </a:p>
           <a:p>
             <a:pPr lvl="1"/>
             <a:r>
               <a:rPr lang="es-ES" dirty="0" smtClean="0"/>
-              <a:t>un </a:t>
-            </a:r>
-            <a:r>
-              <a:rPr lang="es-ES" dirty="0"/>
-              <a:t>10 % de </a:t>
-            </a:r>
-            <a:r>
-              <a:rPr lang="es-ES" dirty="0" smtClean="0"/>
-              <a:t>apps que </a:t>
-            </a:r>
-            <a:r>
-              <a:rPr lang="es-ES" dirty="0"/>
-              <a:t>ya hayan sido objeto de seguimiento en el período </a:t>
-            </a:r>
-            <a:r>
-              <a:rPr lang="es-ES" dirty="0" smtClean="0"/>
-              <a:t>anterior (España: min. 5)</a:t>
-            </a:r>
-          </a:p>
-          <a:p>
-            <a:pPr lvl="1"/>
-            <a:r>
-              <a:rPr lang="es-ES" dirty="0" smtClean="0"/>
-              <a:t>un </a:t>
-            </a:r>
-            <a:r>
-              <a:rPr lang="es-ES" dirty="0"/>
-              <a:t>50 % de </a:t>
-            </a:r>
-            <a:r>
-              <a:rPr lang="es-ES" dirty="0" smtClean="0"/>
-              <a:t>apps </a:t>
-            </a:r>
-            <a:r>
-              <a:rPr lang="es-ES" dirty="0"/>
-              <a:t>que no hayan sido objeto de seguimiento en ese </a:t>
-            </a:r>
-            <a:r>
-              <a:rPr lang="es-ES" dirty="0" smtClean="0"/>
-              <a:t>período (España: mín. 26)</a:t>
-            </a:r>
-            <a:endParaRPr lang="es-ES" dirty="0"/>
+              <a:t>Si la </a:t>
+            </a:r>
+            <a:r>
+              <a:rPr lang="es-ES" dirty="0"/>
+              <a:t>versión más reciente no </a:t>
+            </a:r>
+            <a:r>
+              <a:rPr lang="es-ES" dirty="0" smtClean="0"/>
+              <a:t>es compatible </a:t>
+            </a:r>
+            <a:r>
+              <a:rPr lang="es-ES" dirty="0"/>
+              <a:t>con un sistema operativo antiguo, pero todavía en </a:t>
+            </a:r>
+            <a:r>
+              <a:rPr lang="es-ES" dirty="0" smtClean="0"/>
+              <a:t>uso, se acepta también una versión anterior.</a:t>
+            </a:r>
+          </a:p>
+          <a:p>
+            <a:r>
+              <a:rPr lang="es-ES" dirty="0" smtClean="0"/>
+              <a:t>Se consultará a las </a:t>
+            </a:r>
+            <a:r>
+              <a:rPr lang="es-ES" dirty="0"/>
+              <a:t>organizaciones </a:t>
+            </a:r>
+            <a:r>
+              <a:rPr lang="es-ES" dirty="0" smtClean="0"/>
+              <a:t>de personas </a:t>
+            </a:r>
+            <a:r>
+              <a:rPr lang="es-ES" dirty="0"/>
+              <a:t>con </a:t>
+            </a:r>
+            <a:r>
+              <a:rPr lang="es-ES" dirty="0" smtClean="0"/>
+              <a:t>discapacidad.</a:t>
+            </a:r>
           </a:p>
         </p:txBody>
       </p:sp>
@@ -10688,7 +10731,7 @@
     </p:spTree>
     <p:extLst>
       <p:ext uri="{BB962C8B-B14F-4D97-AF65-F5344CB8AC3E}">
-        <p14:creationId xmlns:p14="http://schemas.microsoft.com/office/powerpoint/2010/main" val="2121161257"/>
+        <p14:creationId xmlns:p14="http://schemas.microsoft.com/office/powerpoint/2010/main" val="1509397880"/>
       </p:ext>
     </p:extLst>
   </p:cSld>
@@ -10756,7 +10799,7 @@
             </a:br>
             <a:r>
               <a:rPr lang="es-ES" dirty="0" smtClean="0"/>
-              <a:t>Selección de la muestra</a:t>
+              <a:t>Selección de pantallas de una app (1/2)</a:t>
             </a:r>
             <a:endParaRPr lang="es-ES" dirty="0"/>
           </a:p>
@@ -10775,144 +10818,173 @@
         <p:spPr/>
         <p:txBody>
           <a:bodyPr>
-            <a:normAutofit lnSpcReduction="10000"/>
+            <a:normAutofit fontScale="77500" lnSpcReduction="20000"/>
           </a:bodyPr>
           <a:lstStyle/>
           <a:p>
-            <a:r>
-              <a:rPr lang="es-ES" dirty="0" smtClean="0"/>
-              <a:t>La </a:t>
-            </a:r>
-            <a:r>
-              <a:rPr lang="es-ES" dirty="0"/>
-              <a:t>muestra </a:t>
-            </a:r>
-            <a:r>
-              <a:rPr lang="es-ES" dirty="0" smtClean="0"/>
-              <a:t>debe ser diversa </a:t>
-            </a:r>
-            <a:r>
-              <a:rPr lang="es-ES" dirty="0"/>
-              <a:t>y representativa. </a:t>
+            <a:pPr marL="514350" indent="-514350">
+              <a:buFont typeface="+mj-lt"/>
+              <a:buAutoNum type="alphaLcParenR"/>
+            </a:pPr>
+            <a:r>
+              <a:rPr lang="es-ES" dirty="0" smtClean="0"/>
+              <a:t>pantallas </a:t>
+            </a:r>
+            <a:r>
+              <a:rPr lang="es-ES" dirty="0"/>
+              <a:t>de inicio, inicio de sesión, mapa </a:t>
+            </a:r>
+            <a:r>
+              <a:rPr lang="es-ES" dirty="0" smtClean="0"/>
+              <a:t>de la app, </a:t>
+            </a:r>
+            <a:r>
+              <a:rPr lang="es-ES" dirty="0"/>
+              <a:t>contacto, ayuda e información legal; </a:t>
             </a:r>
             <a:endParaRPr lang="es-ES" dirty="0" smtClean="0"/>
           </a:p>
           <a:p>
-            <a:r>
-              <a:rPr lang="es-ES" dirty="0" smtClean="0"/>
-              <a:t>Se </a:t>
-            </a:r>
-            <a:r>
-              <a:rPr lang="es-ES" dirty="0"/>
-              <a:t>tomarán en </a:t>
-            </a:r>
-            <a:r>
-              <a:rPr lang="es-ES" dirty="0" smtClean="0"/>
-              <a:t>consideración apps descargadas </a:t>
-            </a:r>
-            <a:r>
-              <a:rPr lang="es-ES" dirty="0"/>
-              <a:t>con mayor frecuencia</a:t>
-            </a:r>
-            <a:r>
-              <a:rPr lang="es-ES" dirty="0" smtClean="0"/>
-              <a:t>.</a:t>
-            </a:r>
-          </a:p>
-          <a:p>
-            <a:r>
-              <a:rPr lang="es-ES" dirty="0"/>
-              <a:t>S</a:t>
-            </a:r>
-            <a:r>
-              <a:rPr lang="es-ES" dirty="0" smtClean="0"/>
-              <a:t>e </a:t>
-            </a:r>
-            <a:r>
-              <a:rPr lang="es-ES" dirty="0"/>
-              <a:t>tendrán en cuenta los diferentes sistemas </a:t>
-            </a:r>
-            <a:r>
-              <a:rPr lang="es-ES" dirty="0" smtClean="0"/>
-              <a:t>operativos </a:t>
-            </a:r>
-          </a:p>
-          <a:p>
-            <a:pPr lvl="1"/>
-            <a:r>
-              <a:rPr lang="es-ES" dirty="0" smtClean="0"/>
-              <a:t>Las </a:t>
-            </a:r>
-            <a:r>
-              <a:rPr lang="es-ES" dirty="0"/>
-              <a:t>versiones de una </a:t>
-            </a:r>
-            <a:r>
-              <a:rPr lang="es-ES" dirty="0" smtClean="0"/>
-              <a:t>app </a:t>
-            </a:r>
-            <a:r>
-              <a:rPr lang="es-ES" dirty="0"/>
-              <a:t>para diferentes sistemas operativos se considerarán </a:t>
-            </a:r>
-            <a:r>
-              <a:rPr lang="es-ES" dirty="0" smtClean="0"/>
-              <a:t>apps distintas.</a:t>
-            </a:r>
-          </a:p>
-          <a:p>
-            <a:r>
-              <a:rPr lang="es-ES" dirty="0"/>
-              <a:t>Solo se incluirá en la muestra la versión más reciente de una </a:t>
-            </a:r>
-            <a:r>
-              <a:rPr lang="es-ES" dirty="0" smtClean="0"/>
-              <a:t>app</a:t>
-            </a:r>
-          </a:p>
-          <a:p>
-            <a:pPr lvl="1"/>
-            <a:r>
-              <a:rPr lang="es-ES" dirty="0" smtClean="0"/>
-              <a:t>Si la </a:t>
-            </a:r>
-            <a:r>
-              <a:rPr lang="es-ES" dirty="0"/>
-              <a:t>versión más reciente no </a:t>
-            </a:r>
-            <a:r>
-              <a:rPr lang="es-ES" dirty="0" smtClean="0"/>
-              <a:t>es compatible </a:t>
-            </a:r>
-            <a:r>
-              <a:rPr lang="es-ES" dirty="0"/>
-              <a:t>con un sistema operativo antiguo, pero todavía en </a:t>
-            </a:r>
-            <a:r>
-              <a:rPr lang="es-ES" dirty="0" smtClean="0"/>
-              <a:t>uso, se acepta también una versión anterior.</a:t>
-            </a:r>
-          </a:p>
-          <a:p>
-            <a:r>
-              <a:rPr lang="es-ES" dirty="0" smtClean="0"/>
-              <a:t>Se consultará a las </a:t>
-            </a:r>
-            <a:r>
-              <a:rPr lang="es-ES" dirty="0"/>
-              <a:t>organizaciones </a:t>
-            </a:r>
-            <a:r>
-              <a:rPr lang="es-ES" dirty="0" smtClean="0"/>
-              <a:t>de personas </a:t>
-            </a:r>
-            <a:r>
-              <a:rPr lang="es-ES" dirty="0"/>
-              <a:t>con </a:t>
-            </a:r>
-            <a:r>
-              <a:rPr lang="es-ES" dirty="0" smtClean="0"/>
-              <a:t>discapacidad.</a:t>
+            <a:pPr marL="514350" indent="-514350">
+              <a:buFont typeface="+mj-lt"/>
+              <a:buAutoNum type="alphaLcParenR"/>
+            </a:pPr>
+            <a:r>
+              <a:rPr lang="es-ES" dirty="0" smtClean="0"/>
+              <a:t>como </a:t>
+            </a:r>
+            <a:r>
+              <a:rPr lang="es-ES" dirty="0"/>
+              <a:t>mínimo, una </a:t>
+            </a:r>
+            <a:r>
+              <a:rPr lang="es-ES" dirty="0" smtClean="0"/>
+              <a:t>pantalla </a:t>
+            </a:r>
+            <a:r>
+              <a:rPr lang="es-ES" dirty="0"/>
+              <a:t>pertinente para cada tipo de servicio prestado </a:t>
+            </a:r>
+            <a:r>
+              <a:rPr lang="es-ES" dirty="0" smtClean="0"/>
+              <a:t>por la app y para cualquier </a:t>
+            </a:r>
+            <a:r>
+              <a:rPr lang="es-ES" dirty="0"/>
+              <a:t>otro uso principal previsto </a:t>
+            </a:r>
+            <a:r>
+              <a:rPr lang="es-ES" dirty="0" smtClean="0"/>
+              <a:t>dela app, incluida </a:t>
+            </a:r>
+            <a:r>
+              <a:rPr lang="es-ES" dirty="0"/>
+              <a:t>la función de búsqueda; </a:t>
+            </a:r>
+            <a:endParaRPr lang="es-ES" dirty="0" smtClean="0"/>
+          </a:p>
+          <a:p>
+            <a:pPr marL="514350" indent="-514350">
+              <a:buFont typeface="+mj-lt"/>
+              <a:buAutoNum type="alphaLcParenR"/>
+            </a:pPr>
+            <a:r>
+              <a:rPr lang="es-ES" dirty="0" smtClean="0"/>
+              <a:t>las pantallas que </a:t>
+            </a:r>
+            <a:r>
+              <a:rPr lang="es-ES" dirty="0"/>
+              <a:t>contengan la declaración o la política de accesibilidad y el mecanismo de comunicación; </a:t>
+            </a:r>
+            <a:endParaRPr lang="es-ES" dirty="0" smtClean="0"/>
+          </a:p>
+          <a:p>
+            <a:pPr marL="514350" indent="-514350">
+              <a:buFont typeface="+mj-lt"/>
+              <a:buAutoNum type="alphaLcParenR"/>
+            </a:pPr>
+            <a:r>
+              <a:rPr lang="es-ES" dirty="0" smtClean="0"/>
+              <a:t>ejemplos </a:t>
+            </a:r>
+            <a:r>
+              <a:rPr lang="es-ES" dirty="0"/>
+              <a:t>de las </a:t>
+            </a:r>
+            <a:r>
+              <a:rPr lang="es-ES" dirty="0" smtClean="0"/>
+              <a:t>pantallas cuya </a:t>
+            </a:r>
+            <a:r>
+              <a:rPr lang="es-ES" dirty="0"/>
+              <a:t>apariencia sea sustancialmente distinta o que presenten un tipo de contenido diferente; </a:t>
+            </a:r>
+            <a:endParaRPr lang="es-ES" dirty="0" smtClean="0"/>
+          </a:p>
+          <a:p>
+            <a:pPr marL="514350" indent="-514350">
+              <a:buFont typeface="+mj-lt"/>
+              <a:buAutoNum type="alphaLcParenR"/>
+            </a:pPr>
+            <a:r>
+              <a:rPr lang="es-ES" dirty="0" smtClean="0"/>
+              <a:t>como </a:t>
+            </a:r>
+            <a:r>
+              <a:rPr lang="es-ES" dirty="0"/>
+              <a:t>mínimo, un documento descargable pertinente, si procede, para cada tipo de servicio prestado por </a:t>
+            </a:r>
+            <a:r>
+              <a:rPr lang="es-ES" dirty="0" smtClean="0"/>
+              <a:t>la app y </a:t>
+            </a:r>
+            <a:r>
+              <a:rPr lang="es-ES" dirty="0"/>
+              <a:t>cualquier otro uso principal previsto </a:t>
+            </a:r>
+            <a:r>
+              <a:rPr lang="es-ES" dirty="0" smtClean="0"/>
+              <a:t>de la app;</a:t>
+            </a:r>
+          </a:p>
+          <a:p>
+            <a:pPr marL="514350" indent="-514350">
+              <a:buFont typeface="+mj-lt"/>
+              <a:buAutoNum type="alphaLcParenR"/>
+            </a:pPr>
+            <a:r>
+              <a:rPr lang="es-ES" dirty="0"/>
+              <a:t>cualquier otra </a:t>
+            </a:r>
+            <a:r>
+              <a:rPr lang="es-ES" dirty="0" smtClean="0"/>
+              <a:t>pantalla que </a:t>
+            </a:r>
+            <a:r>
+              <a:rPr lang="es-ES" dirty="0"/>
+              <a:t>el organismo de seguimiento considere pertinente</a:t>
+            </a:r>
+            <a:r>
+              <a:rPr lang="es-ES" dirty="0" smtClean="0"/>
+              <a:t>;</a:t>
+            </a:r>
+          </a:p>
+          <a:p>
+            <a:pPr marL="514350" indent="-514350">
+              <a:buFont typeface="+mj-lt"/>
+              <a:buAutoNum type="alphaLcParenR"/>
+            </a:pPr>
+            <a:r>
+              <a:rPr lang="es-ES" dirty="0" smtClean="0"/>
+              <a:t>pantallas </a:t>
+            </a:r>
+            <a:r>
+              <a:rPr lang="es-ES" dirty="0"/>
+              <a:t>seleccionadas al azar que representen, como mínimo, un 10 % de la </a:t>
+            </a:r>
+            <a:r>
+              <a:rPr lang="es-ES" dirty="0" smtClean="0"/>
+              <a:t>muestra.</a:t>
             </a:r>
           </a:p>
         </p:txBody>
@@ -10943,7 +11015,7 @@
     </p:spTree>
     <p:extLst>
       <p:ext uri="{BB962C8B-B14F-4D97-AF65-F5344CB8AC3E}">
-        <p14:creationId xmlns:p14="http://schemas.microsoft.com/office/powerpoint/2010/main" val="1509397880"/>
+        <p14:creationId xmlns:p14="http://schemas.microsoft.com/office/powerpoint/2010/main" val="400507632"/>
       </p:ext>
     </p:extLst>
   </p:cSld>
@@ -11011,7 +11083,7 @@
             </a:br>
             <a:r>
               <a:rPr lang="es-ES" dirty="0" smtClean="0"/>
-              <a:t>Selección de pantallas de una app (1/2)</a:t>
+              <a:t>Selección de pantallas de una app (2/2)</a:t>
             </a:r>
             <a:endParaRPr lang="es-ES" dirty="0"/>
           </a:p>
@@ -11030,173 +11102,63 @@
         <p:spPr/>
         <p:txBody>
           <a:bodyPr>
-            <a:normAutofit fontScale="77500" lnSpcReduction="20000"/>
+            <a:normAutofit/>
           </a:bodyPr>
           <a:lstStyle/>
           <a:p>
-            <a:pPr marL="514350" indent="-514350">
-              <a:buFont typeface="+mj-lt"/>
-              <a:buAutoNum type="alphaLcParenR"/>
-            </a:pPr>
+            <a:r>
+              <a:rPr lang="es-ES" dirty="0"/>
+              <a:t>Si cualquiera de las </a:t>
+            </a:r>
             <a:r>
               <a:rPr lang="es-ES" dirty="0" smtClean="0"/>
               <a:t>pantallas </a:t>
             </a:r>
             <a:r>
               <a:rPr lang="es-ES" dirty="0"/>
-              <a:t>de inicio, inicio de sesión, mapa </a:t>
-            </a:r>
-            <a:r>
-              <a:rPr lang="es-ES" dirty="0" smtClean="0"/>
-              <a:t>de la app, </a:t>
-            </a:r>
-            <a:r>
-              <a:rPr lang="es-ES" dirty="0"/>
-              <a:t>contacto, ayuda e información legal; </a:t>
-            </a:r>
-            <a:endParaRPr lang="es-ES" dirty="0" smtClean="0"/>
-          </a:p>
-          <a:p>
-            <a:pPr marL="514350" indent="-514350">
-              <a:buFont typeface="+mj-lt"/>
-              <a:buAutoNum type="alphaLcParenR"/>
-            </a:pPr>
-            <a:r>
-              <a:rPr lang="es-ES" dirty="0" smtClean="0"/>
-              <a:t>como </a:t>
-            </a:r>
-            <a:r>
-              <a:rPr lang="es-ES" dirty="0"/>
-              <a:t>mínimo, una </a:t>
-            </a:r>
-            <a:r>
-              <a:rPr lang="es-ES" dirty="0" smtClean="0"/>
-              <a:t>pantalla </a:t>
-            </a:r>
-            <a:r>
-              <a:rPr lang="es-ES" dirty="0"/>
-              <a:t>pertinente para cada tipo de servicio prestado </a:t>
-            </a:r>
-            <a:r>
-              <a:rPr lang="es-ES" dirty="0" smtClean="0"/>
-              <a:t>por la app y para cualquier </a:t>
-            </a:r>
-            <a:r>
-              <a:rPr lang="es-ES" dirty="0"/>
-              <a:t>otro uso principal previsto </a:t>
-            </a:r>
-            <a:r>
-              <a:rPr lang="es-ES" dirty="0" smtClean="0"/>
-              <a:t>dela app, incluida </a:t>
-            </a:r>
-            <a:r>
-              <a:rPr lang="es-ES" dirty="0"/>
-              <a:t>la función de búsqueda; </a:t>
-            </a:r>
-            <a:endParaRPr lang="es-ES" dirty="0" smtClean="0"/>
-          </a:p>
-          <a:p>
-            <a:pPr marL="514350" indent="-514350">
-              <a:buFont typeface="+mj-lt"/>
-              <a:buAutoNum type="alphaLcParenR"/>
-            </a:pPr>
-            <a:r>
-              <a:rPr lang="es-ES" dirty="0" smtClean="0"/>
-              <a:t>las pantallas que </a:t>
-            </a:r>
-            <a:r>
-              <a:rPr lang="es-ES" dirty="0"/>
-              <a:t>contengan la declaración o la política de accesibilidad y el mecanismo de comunicación; </a:t>
-            </a:r>
-            <a:endParaRPr lang="es-ES" dirty="0" smtClean="0"/>
-          </a:p>
-          <a:p>
-            <a:pPr marL="514350" indent="-514350">
-              <a:buFont typeface="+mj-lt"/>
-              <a:buAutoNum type="alphaLcParenR"/>
-            </a:pPr>
-            <a:r>
-              <a:rPr lang="es-ES" dirty="0" smtClean="0"/>
-              <a:t>ejemplos </a:t>
-            </a:r>
-            <a:r>
-              <a:rPr lang="es-ES" dirty="0"/>
-              <a:t>de las </a:t>
-            </a:r>
-            <a:r>
-              <a:rPr lang="es-ES" dirty="0" smtClean="0"/>
-              <a:t>pantallas cuya </a:t>
-            </a:r>
-            <a:r>
-              <a:rPr lang="es-ES" dirty="0"/>
-              <a:t>apariencia sea sustancialmente distinta o que presenten un tipo de contenido diferente; </a:t>
-            </a:r>
-            <a:endParaRPr lang="es-ES" dirty="0" smtClean="0"/>
-          </a:p>
-          <a:p>
-            <a:pPr marL="514350" indent="-514350">
-              <a:buFont typeface="+mj-lt"/>
-              <a:buAutoNum type="alphaLcParenR"/>
-            </a:pPr>
-            <a:r>
-              <a:rPr lang="es-ES" dirty="0" smtClean="0"/>
-              <a:t>como </a:t>
-            </a:r>
-            <a:r>
-              <a:rPr lang="es-ES" dirty="0"/>
-              <a:t>mínimo, un documento descargable pertinente, si procede, para cada tipo de servicio prestado por </a:t>
-            </a:r>
-            <a:r>
-              <a:rPr lang="es-ES" dirty="0" smtClean="0"/>
-              <a:t>la app y </a:t>
-            </a:r>
-            <a:r>
-              <a:rPr lang="es-ES" dirty="0"/>
-              <a:t>cualquier otro uso principal previsto </a:t>
-            </a:r>
-            <a:r>
-              <a:rPr lang="es-ES" dirty="0" smtClean="0"/>
-              <a:t>de la app;</a:t>
-            </a:r>
-          </a:p>
-          <a:p>
-            <a:pPr marL="514350" indent="-514350">
-              <a:buFont typeface="+mj-lt"/>
-              <a:buAutoNum type="alphaLcParenR"/>
-            </a:pPr>
-            <a:r>
-              <a:rPr lang="es-ES" dirty="0"/>
-              <a:t>cualquier otra </a:t>
-            </a:r>
-            <a:r>
-              <a:rPr lang="es-ES" dirty="0" smtClean="0"/>
-              <a:t>pantalla que </a:t>
-            </a:r>
-            <a:r>
-              <a:rPr lang="es-ES" dirty="0"/>
-              <a:t>el organismo de seguimiento considere pertinente</a:t>
-            </a:r>
-            <a:r>
-              <a:rPr lang="es-ES" dirty="0" smtClean="0"/>
-              <a:t>;</a:t>
-            </a:r>
-          </a:p>
-          <a:p>
-            <a:pPr marL="514350" indent="-514350">
-              <a:buFont typeface="+mj-lt"/>
-              <a:buAutoNum type="alphaLcParenR"/>
-            </a:pPr>
-            <a:r>
-              <a:rPr lang="es-ES" dirty="0" smtClean="0"/>
-              <a:t>pantallas </a:t>
-            </a:r>
-            <a:r>
-              <a:rPr lang="es-ES" dirty="0"/>
-              <a:t>seleccionadas al azar que representen, como mínimo, un 10 % de la </a:t>
-            </a:r>
-            <a:r>
-              <a:rPr lang="es-ES" dirty="0" smtClean="0"/>
-              <a:t>muestra.</a:t>
+              <a:t>de la muestra seleccionada </a:t>
+            </a:r>
+            <a:r>
+              <a:rPr lang="es-ES" dirty="0" smtClean="0"/>
+              <a:t>incluye </a:t>
+            </a:r>
+            <a:r>
+              <a:rPr lang="es-ES" dirty="0"/>
+              <a:t>una etapa de un proceso, deberán verificarse todas las etapas del </a:t>
+            </a:r>
+            <a:r>
+              <a:rPr lang="es-ES" dirty="0" smtClean="0"/>
+              <a:t>proceso</a:t>
+            </a:r>
+          </a:p>
+          <a:p>
+            <a:r>
+              <a:rPr lang="es-ES" dirty="0" smtClean="0"/>
+              <a:t>En </a:t>
+            </a:r>
+            <a:r>
+              <a:rPr lang="es-ES" dirty="0"/>
+              <a:t>el caso del método de seguimiento simplificado, además de la </a:t>
+            </a:r>
+            <a:r>
+              <a:rPr lang="es-ES" dirty="0" smtClean="0"/>
+              <a:t>pantalla de </a:t>
+            </a:r>
+            <a:r>
+              <a:rPr lang="es-ES" dirty="0"/>
+              <a:t>inicio, se hará un seguimiento de un número de </a:t>
+            </a:r>
+            <a:r>
+              <a:rPr lang="es-ES" dirty="0" smtClean="0"/>
+              <a:t>pantallas apropiado </a:t>
+            </a:r>
+            <a:r>
+              <a:rPr lang="es-ES" dirty="0"/>
+              <a:t>de acuerdo con el tamaño estimado y la complejidad </a:t>
+            </a:r>
+            <a:r>
+              <a:rPr lang="es-ES" dirty="0" smtClean="0"/>
+              <a:t>de la app.</a:t>
             </a:r>
           </a:p>
         </p:txBody>
@@ -11227,7 +11189,7 @@
     </p:spTree>
     <p:extLst>
       <p:ext uri="{BB962C8B-B14F-4D97-AF65-F5344CB8AC3E}">
-        <p14:creationId xmlns:p14="http://schemas.microsoft.com/office/powerpoint/2010/main" val="400507632"/>
+        <p14:creationId xmlns:p14="http://schemas.microsoft.com/office/powerpoint/2010/main" val="1623091348"/>
       </p:ext>
     </p:extLst>
   </p:cSld>
@@ -11273,104 +11235,111 @@
         </p:nvSpPr>
         <p:spPr/>
         <p:txBody>
+          <a:bodyPr/>
+          <a:lstStyle/>
+          <a:p>
+            <a:r>
+              <a:rPr lang="es-ES" dirty="0" smtClean="0"/>
+              <a:t>7. Seguimiento </a:t>
+            </a:r>
+            <a:r>
+              <a:rPr lang="es-ES" dirty="0"/>
+              <a:t>y presentación de </a:t>
+            </a:r>
+            <a:r>
+              <a:rPr lang="es-ES" dirty="0" smtClean="0"/>
+              <a:t>informes</a:t>
+            </a:r>
+            <a:br>
+              <a:rPr lang="es-ES" dirty="0" smtClean="0"/>
+            </a:br>
+            <a:r>
+              <a:rPr lang="es-ES" dirty="0" smtClean="0"/>
+              <a:t>Decisión (UE) 2018/1524 </a:t>
+            </a:r>
+            <a:endParaRPr lang="es-ES" dirty="0"/>
+          </a:p>
+        </p:txBody>
+      </p:sp>
+      <p:sp>
+        <p:nvSpPr>
+          <p:cNvPr id="3" name="Marcador de contenido 2"/>
+          <p:cNvSpPr>
+            <a:spLocks noGrp="1"/>
+          </p:cNvSpPr>
+          <p:nvPr>
+            <p:ph idx="1"/>
+          </p:nvPr>
+        </p:nvSpPr>
+        <p:spPr/>
+        <p:txBody>
           <a:bodyPr>
             <a:normAutofit/>
           </a:bodyPr>
           <a:lstStyle/>
           <a:p>
-            <a:r>
-              <a:rPr lang="es-ES" dirty="0" smtClean="0"/>
-              <a:t>7.2 </a:t>
-            </a:r>
-            <a:r>
-              <a:rPr lang="es-ES" dirty="0"/>
-              <a:t>Muestreo de las </a:t>
-            </a:r>
-            <a:r>
-              <a:rPr lang="es-ES" dirty="0" smtClean="0"/>
-              <a:t>apps</a:t>
-            </a:r>
-            <a:br>
-              <a:rPr lang="es-ES" dirty="0" smtClean="0"/>
-            </a:br>
-            <a:r>
-              <a:rPr lang="es-ES" dirty="0" smtClean="0"/>
-              <a:t>Selección de pantallas de una app (2/2)</a:t>
-            </a:r>
-            <a:endParaRPr lang="es-ES" dirty="0"/>
-          </a:p>
-        </p:txBody>
-      </p:sp>
-      <p:sp>
-        <p:nvSpPr>
-          <p:cNvPr id="3" name="Marcador de contenido 2"/>
-          <p:cNvSpPr>
-            <a:spLocks noGrp="1"/>
-          </p:cNvSpPr>
-          <p:nvPr>
-            <p:ph idx="1"/>
-          </p:nvPr>
-        </p:nvSpPr>
-        <p:spPr/>
-        <p:txBody>
-          <a:bodyPr>
-            <a:normAutofit/>
-          </a:bodyPr>
-          <a:lstStyle/>
-          <a:p>
-            <a:r>
-              <a:rPr lang="es-ES" dirty="0"/>
-              <a:t>Si cualquiera de las </a:t>
-            </a:r>
-            <a:r>
-              <a:rPr lang="es-ES" dirty="0" smtClean="0"/>
-              <a:t>pantallas </a:t>
-            </a:r>
-            <a:r>
-              <a:rPr lang="es-ES" dirty="0"/>
-              <a:t>de la muestra seleccionada </a:t>
-            </a:r>
-            <a:r>
-              <a:rPr lang="es-ES" dirty="0" smtClean="0"/>
-              <a:t>incluye </a:t>
-            </a:r>
-            <a:r>
-              <a:rPr lang="es-ES" dirty="0"/>
-              <a:t>una etapa de un proceso, deberán verificarse todas las etapas del </a:t>
-            </a:r>
-            <a:r>
-              <a:rPr lang="es-ES" dirty="0" smtClean="0"/>
-              <a:t>proceso</a:t>
-            </a:r>
-          </a:p>
-          <a:p>
-            <a:r>
-              <a:rPr lang="es-ES" dirty="0" smtClean="0"/>
-              <a:t>En </a:t>
-            </a:r>
-            <a:r>
-              <a:rPr lang="es-ES" dirty="0"/>
-              <a:t>el caso del método de seguimiento simplificado, además de la </a:t>
-            </a:r>
-            <a:r>
-              <a:rPr lang="es-ES" dirty="0" smtClean="0"/>
-              <a:t>pantalla de </a:t>
-            </a:r>
-            <a:r>
-              <a:rPr lang="es-ES" dirty="0"/>
-              <a:t>inicio, se hará un seguimiento de un número de </a:t>
-            </a:r>
-            <a:r>
-              <a:rPr lang="es-ES" dirty="0" smtClean="0"/>
-              <a:t>pantallas apropiado </a:t>
-            </a:r>
-            <a:r>
-              <a:rPr lang="es-ES" dirty="0"/>
-              <a:t>de acuerdo con el tamaño estimado y la complejidad </a:t>
-            </a:r>
-            <a:r>
-              <a:rPr lang="es-ES" dirty="0" smtClean="0"/>
-              <a:t>de la app.</a:t>
+            <a:pPr marL="514350" indent="-514350">
+              <a:buFont typeface="+mj-lt"/>
+              <a:buAutoNum type="arabicPeriod"/>
+            </a:pPr>
+            <a:r>
+              <a:rPr lang="es-ES" dirty="0" smtClean="0"/>
+              <a:t>Método </a:t>
+            </a:r>
+            <a:r>
+              <a:rPr lang="es-ES" dirty="0" smtClean="0"/>
+              <a:t>de </a:t>
+            </a:r>
+            <a:r>
+              <a:rPr lang="es-ES" dirty="0" smtClean="0"/>
+              <a:t>seguimiento en profundidad</a:t>
+            </a:r>
+            <a:endParaRPr lang="es-ES" dirty="0" smtClean="0"/>
+          </a:p>
+          <a:p>
+            <a:pPr marL="514350" indent="-514350">
+              <a:buFont typeface="+mj-lt"/>
+              <a:buAutoNum type="arabicPeriod"/>
+            </a:pPr>
+            <a:r>
+              <a:rPr lang="es-ES" dirty="0"/>
+              <a:t>Muestreo de </a:t>
+            </a:r>
+            <a:r>
+              <a:rPr lang="es-ES" dirty="0" smtClean="0"/>
+              <a:t>las </a:t>
+            </a:r>
+            <a:r>
+              <a:rPr lang="es-ES" dirty="0"/>
+              <a:t>aplicaciones para dispositivos </a:t>
+            </a:r>
+            <a:r>
+              <a:rPr lang="es-ES" dirty="0" smtClean="0"/>
+              <a:t>móviles</a:t>
+            </a:r>
+          </a:p>
+          <a:p>
+            <a:pPr marL="514350" indent="-514350">
+              <a:buFont typeface="+mj-lt"/>
+              <a:buAutoNum type="arabicPeriod"/>
+            </a:pPr>
+            <a:r>
+              <a:rPr lang="es-ES" dirty="0" smtClean="0"/>
+              <a:t>Informe de seguimiento</a:t>
+            </a:r>
+          </a:p>
+          <a:p>
+            <a:pPr lvl="1"/>
+            <a:r>
+              <a:rPr lang="es-ES" dirty="0" smtClean="0"/>
+              <a:t>Contenido</a:t>
+            </a:r>
+          </a:p>
+          <a:p>
+            <a:pPr lvl="1"/>
+            <a:r>
+              <a:rPr lang="es-ES" dirty="0" smtClean="0"/>
+              <a:t>Frecuencia de presentación</a:t>
             </a:r>
           </a:p>
         </p:txBody>
@@ -11398,10 +11367,50 @@
           </a:p>
         </p:txBody>
       </p:sp>
+      <p:sp>
+        <p:nvSpPr>
+          <p:cNvPr id="5" name="Flecha derecha 4" title="&quot;&quot;"/>
+          <p:cNvSpPr/>
+          <p:nvPr/>
+        </p:nvSpPr>
+        <p:spPr>
+          <a:xfrm>
+            <a:off x="120032" y="2969123"/>
+            <a:ext cx="406741" cy="241216"/>
+          </a:xfrm>
+          <a:prstGeom prst="rightArrow">
+            <a:avLst/>
+          </a:prstGeom>
+        </p:spPr>
+        <p:style>
+          <a:lnRef idx="2">
+            <a:schemeClr val="accent1">
+              <a:shade val="50000"/>
+            </a:schemeClr>
+          </a:lnRef>
+          <a:fillRef idx="1">
+            <a:schemeClr val="accent1"/>
+          </a:fillRef>
+          <a:effectRef idx="0">
+            <a:schemeClr val="accent1"/>
+          </a:effectRef>
+          <a:fontRef idx="minor">
+            <a:schemeClr val="lt1"/>
+          </a:fontRef>
+        </p:style>
+        <p:txBody>
+          <a:bodyPr rtlCol="0" anchor="ctr"/>
+          <a:lstStyle/>
+          <a:p>
+            <a:pPr algn="ctr"/>
+            <a:endParaRPr lang="es-ES"/>
+          </a:p>
+        </p:txBody>
+      </p:sp>
     </p:spTree>
     <p:extLst>
       <p:ext uri="{BB962C8B-B14F-4D97-AF65-F5344CB8AC3E}">
-        <p14:creationId xmlns:p14="http://schemas.microsoft.com/office/powerpoint/2010/main" val="1623091348"/>
+        <p14:creationId xmlns:p14="http://schemas.microsoft.com/office/powerpoint/2010/main" val="1124406098"/>
       </p:ext>
     </p:extLst>
   </p:cSld>
@@ -11447,48 +11456,44 @@
         </p:nvSpPr>
         <p:spPr/>
         <p:txBody>
-          <a:bodyPr/>
-          <a:lstStyle/>
-          <a:p>
-            <a:r>
-              <a:rPr lang="es-ES" dirty="0" smtClean="0"/>
-              <a:t>7. Seguimiento </a:t>
-            </a:r>
-            <a:r>
-              <a:rPr lang="es-ES" dirty="0"/>
-              <a:t>y presentación de </a:t>
-            </a:r>
-            <a:r>
-              <a:rPr lang="es-ES" dirty="0" smtClean="0"/>
-              <a:t>informes</a:t>
-            </a:r>
-            <a:br>
-              <a:rPr lang="es-ES" dirty="0" smtClean="0"/>
-            </a:br>
-            <a:r>
-              <a:rPr lang="es-ES" dirty="0" smtClean="0"/>
-              <a:t>Decisión (UE) 2018/1524 </a:t>
-            </a:r>
-            <a:endParaRPr lang="es-ES" dirty="0"/>
-          </a:p>
-        </p:txBody>
-      </p:sp>
-      <p:sp>
-        <p:nvSpPr>
-          <p:cNvPr id="3" name="Marcador de contenido 2"/>
-          <p:cNvSpPr>
-            <a:spLocks noGrp="1"/>
-          </p:cNvSpPr>
-          <p:nvPr>
-            <p:ph idx="1"/>
-          </p:nvPr>
-        </p:nvSpPr>
-        <p:spPr/>
-        <p:txBody>
           <a:bodyPr>
             <a:normAutofit/>
           </a:bodyPr>
           <a:lstStyle/>
+          <a:p>
+            <a:r>
+              <a:rPr lang="es-ES" dirty="0" smtClean="0"/>
+              <a:t>7.3 Informe de seguimiento</a:t>
+            </a:r>
+            <a:endParaRPr lang="es-ES" dirty="0"/>
+          </a:p>
+        </p:txBody>
+      </p:sp>
+      <p:sp>
+        <p:nvSpPr>
+          <p:cNvPr id="3" name="Marcador de contenido 2"/>
+          <p:cNvSpPr>
+            <a:spLocks noGrp="1"/>
+          </p:cNvSpPr>
+          <p:nvPr>
+            <p:ph idx="1"/>
+          </p:nvPr>
+        </p:nvSpPr>
+        <p:spPr/>
+        <p:txBody>
+          <a:bodyPr>
+            <a:normAutofit fontScale="70000" lnSpcReduction="20000"/>
+          </a:bodyPr>
+          <a:lstStyle/>
+          <a:p>
+            <a:pPr marL="0" indent="0">
+              <a:buNone/>
+            </a:pPr>
+            <a:r>
+              <a:rPr lang="es-ES" dirty="0" smtClean="0"/>
+              <a:t>Secciones:</a:t>
+            </a:r>
+          </a:p>
           <a:p>
             <a:pPr marL="514350" indent="-514350">
               <a:buFont typeface="+mj-lt"/>
@@ -11496,7 +11501,7 @@
             </a:pPr>
             <a:r>
               <a:rPr lang="es-ES" dirty="0" smtClean="0"/>
-              <a:t>Métodos de seguimiento</a:t>
+              <a:t>Resumen</a:t>
             </a:r>
           </a:p>
           <a:p>
@@ -11506,19 +11511,58 @@
             </a:pPr>
             <a:r>
               <a:rPr lang="es-ES" dirty="0"/>
-              <a:t>Muestreo de </a:t>
-            </a:r>
-            <a:r>
-              <a:rPr lang="es-ES" dirty="0" smtClean="0"/>
-              <a:t>las </a:t>
-            </a:r>
-            <a:r>
-              <a:rPr lang="es-ES" dirty="0"/>
-              <a:t>aplicaciones para dispositivos </a:t>
-            </a:r>
-            <a:r>
-              <a:rPr lang="es-ES" dirty="0" smtClean="0"/>
-              <a:t>móviles</a:t>
+              <a:t>D</a:t>
+            </a:r>
+            <a:r>
+              <a:rPr lang="es-ES" dirty="0" smtClean="0"/>
+              <a:t>escripción de las actividades de seguimiento</a:t>
+            </a:r>
+          </a:p>
+          <a:p>
+            <a:pPr marL="457200" lvl="1" indent="0">
+              <a:buNone/>
+            </a:pPr>
+            <a:r>
+              <a:rPr lang="es-ES" dirty="0"/>
+              <a:t>2.1. Información </a:t>
+            </a:r>
+            <a:r>
+              <a:rPr lang="es-ES" dirty="0" smtClean="0"/>
+              <a:t>general</a:t>
+            </a:r>
+          </a:p>
+          <a:p>
+            <a:pPr marL="457200" lvl="1" indent="0">
+              <a:buNone/>
+            </a:pPr>
+            <a:r>
+              <a:rPr lang="es-ES" dirty="0" smtClean="0"/>
+              <a:t>2.2 Composición </a:t>
+            </a:r>
+            <a:r>
+              <a:rPr lang="es-ES" dirty="0"/>
+              <a:t>de la </a:t>
+            </a:r>
+            <a:r>
+              <a:rPr lang="es-ES" dirty="0" smtClean="0"/>
+              <a:t>muestra</a:t>
+            </a:r>
+          </a:p>
+          <a:p>
+            <a:pPr marL="457200" lvl="1" indent="0">
+              <a:buNone/>
+            </a:pPr>
+            <a:r>
+              <a:rPr lang="es-ES" dirty="0" smtClean="0"/>
+              <a:t>2.3 Correlación </a:t>
+            </a:r>
+            <a:r>
+              <a:rPr lang="es-ES" dirty="0"/>
+              <a:t>con las normas, las especificaciones técnicas y las herramientas utilizadas para el </a:t>
+            </a:r>
+            <a:r>
+              <a:rPr lang="es-ES" dirty="0" smtClean="0"/>
+              <a:t>seguimiento</a:t>
             </a:r>
           </a:p>
           <a:p>
@@ -11528,22 +11572,69 @@
             </a:pPr>
             <a:r>
               <a:rPr lang="es-ES" dirty="0" smtClean="0"/>
-              <a:t>Informe de seguimiento</a:t>
-            </a:r>
-          </a:p>
-          <a:p>
-            <a:pPr lvl="1"/>
-            <a:r>
-              <a:rPr lang="es-ES" dirty="0" smtClean="0"/>
-              <a:t>Contenido</a:t>
-            </a:r>
-          </a:p>
-          <a:p>
-            <a:pPr lvl="1"/>
-            <a:r>
-              <a:rPr lang="es-ES" dirty="0" smtClean="0"/>
-              <a:t>Frecuencia de presentación</a:t>
-            </a:r>
+              <a:t>Resultado del seguimiento</a:t>
+            </a:r>
+          </a:p>
+          <a:p>
+            <a:pPr marL="457200" lvl="1" indent="0">
+              <a:buNone/>
+            </a:pPr>
+            <a:r>
+              <a:rPr lang="es-ES" dirty="0" smtClean="0"/>
+              <a:t>3.1 Resultado detallado</a:t>
+            </a:r>
+          </a:p>
+          <a:p>
+            <a:pPr marL="457200" lvl="1" indent="0">
+              <a:buNone/>
+            </a:pPr>
+            <a:r>
+              <a:rPr lang="es-ES" dirty="0" smtClean="0"/>
+              <a:t>3.2 Contenido </a:t>
+            </a:r>
+            <a:r>
+              <a:rPr lang="es-ES" dirty="0"/>
+              <a:t>complementario (opcional</a:t>
+            </a:r>
+            <a:r>
+              <a:rPr lang="es-ES" dirty="0" smtClean="0"/>
+              <a:t>)</a:t>
+            </a:r>
+          </a:p>
+          <a:p>
+            <a:pPr marL="514350" indent="-514350">
+              <a:buFont typeface="+mj-lt"/>
+              <a:buAutoNum type="arabicPeriod"/>
+            </a:pPr>
+            <a:r>
+              <a:rPr lang="es-ES" dirty="0"/>
+              <a:t>U</a:t>
+            </a:r>
+            <a:r>
+              <a:rPr lang="es-ES" dirty="0" smtClean="0"/>
+              <a:t>so del procedimiento de aplicación y observaciones de los usuarios finales</a:t>
+            </a:r>
+          </a:p>
+          <a:p>
+            <a:pPr marL="514350" indent="-514350">
+              <a:buFont typeface="+mj-lt"/>
+              <a:buAutoNum type="arabicPeriod"/>
+            </a:pPr>
+            <a:r>
+              <a:rPr lang="es-ES" dirty="0"/>
+              <a:t>C</a:t>
+            </a:r>
+            <a:r>
+              <a:rPr lang="es-ES" dirty="0" smtClean="0"/>
+              <a:t>ontenido relacionado con medidas suplementarias</a:t>
+            </a:r>
+          </a:p>
+          <a:p>
+            <a:pPr marL="514350" indent="-514350">
+              <a:buFont typeface="+mj-lt"/>
+              <a:buAutoNum type="arabicPeriod"/>
+            </a:pPr>
+            <a:endParaRPr lang="es-ES" dirty="0" smtClean="0"/>
           </a:p>
         </p:txBody>
       </p:sp>
@@ -11570,50 +11661,10 @@
           </a:p>
         </p:txBody>
       </p:sp>
-      <p:sp>
-        <p:nvSpPr>
-          <p:cNvPr id="5" name="Flecha derecha 4" title="&quot;&quot;"/>
-          <p:cNvSpPr/>
-          <p:nvPr/>
-        </p:nvSpPr>
-        <p:spPr>
-          <a:xfrm>
-            <a:off x="120032" y="2969123"/>
-            <a:ext cx="406741" cy="241216"/>
-          </a:xfrm>
-          <a:prstGeom prst="rightArrow">
-            <a:avLst/>
-          </a:prstGeom>
-        </p:spPr>
-        <p:style>
-          <a:lnRef idx="2">
-            <a:schemeClr val="accent1">
-              <a:shade val="50000"/>
-            </a:schemeClr>
-          </a:lnRef>
-          <a:fillRef idx="1">
-            <a:schemeClr val="accent1"/>
-          </a:fillRef>
-          <a:effectRef idx="0">
-            <a:schemeClr val="accent1"/>
-          </a:effectRef>
-          <a:fontRef idx="minor">
-            <a:schemeClr val="lt1"/>
-          </a:fontRef>
-        </p:style>
-        <p:txBody>
-          <a:bodyPr rtlCol="0" anchor="ctr"/>
-          <a:lstStyle/>
-          <a:p>
-            <a:pPr algn="ctr"/>
-            <a:endParaRPr lang="es-ES"/>
-          </a:p>
-        </p:txBody>
-      </p:sp>
     </p:spTree>
     <p:extLst>
       <p:ext uri="{BB962C8B-B14F-4D97-AF65-F5344CB8AC3E}">
-        <p14:creationId xmlns:p14="http://schemas.microsoft.com/office/powerpoint/2010/main" val="1124406098"/>
+        <p14:creationId xmlns:p14="http://schemas.microsoft.com/office/powerpoint/2010/main" val="3666564641"/>
       </p:ext>
     </p:extLst>
   </p:cSld>
@@ -11979,260 +12030,6 @@
               <a:rPr lang="es-ES" dirty="0" smtClean="0"/>
               <a:t>7.3 Informe de seguimiento</a:t>
             </a:r>
-            <a:endParaRPr lang="es-ES" dirty="0"/>
-          </a:p>
-        </p:txBody>
-      </p:sp>
-      <p:sp>
-        <p:nvSpPr>
-          <p:cNvPr id="3" name="Marcador de contenido 2"/>
-          <p:cNvSpPr>
-            <a:spLocks noGrp="1"/>
-          </p:cNvSpPr>
-          <p:nvPr>
-            <p:ph idx="1"/>
-          </p:nvPr>
-        </p:nvSpPr>
-        <p:spPr/>
-        <p:txBody>
-          <a:bodyPr>
-            <a:normAutofit fontScale="70000" lnSpcReduction="20000"/>
-          </a:bodyPr>
-          <a:lstStyle/>
-          <a:p>
-            <a:pPr marL="0" indent="0">
-              <a:buNone/>
-            </a:pPr>
-            <a:r>
-              <a:rPr lang="es-ES" dirty="0" smtClean="0"/>
-              <a:t>Secciones:</a:t>
-            </a:r>
-          </a:p>
-          <a:p>
-            <a:pPr marL="514350" indent="-514350">
-              <a:buFont typeface="+mj-lt"/>
-              <a:buAutoNum type="arabicPeriod"/>
-            </a:pPr>
-            <a:r>
-              <a:rPr lang="es-ES" dirty="0" smtClean="0"/>
-              <a:t>Resumen</a:t>
-            </a:r>
-          </a:p>
-          <a:p>
-            <a:pPr marL="514350" indent="-514350">
-              <a:buFont typeface="+mj-lt"/>
-              <a:buAutoNum type="arabicPeriod"/>
-            </a:pPr>
-            <a:r>
-              <a:rPr lang="es-ES" dirty="0"/>
-              <a:t>D</a:t>
-            </a:r>
-            <a:r>
-              <a:rPr lang="es-ES" dirty="0" smtClean="0"/>
-              <a:t>escripción de las actividades de seguimiento</a:t>
-            </a:r>
-          </a:p>
-          <a:p>
-            <a:pPr marL="457200" lvl="1" indent="0">
-              <a:buNone/>
-            </a:pPr>
-            <a:r>
-              <a:rPr lang="es-ES" dirty="0"/>
-              <a:t>2.1. Información </a:t>
-            </a:r>
-            <a:r>
-              <a:rPr lang="es-ES" dirty="0" smtClean="0"/>
-              <a:t>general</a:t>
-            </a:r>
-          </a:p>
-          <a:p>
-            <a:pPr marL="457200" lvl="1" indent="0">
-              <a:buNone/>
-            </a:pPr>
-            <a:r>
-              <a:rPr lang="es-ES" dirty="0" smtClean="0"/>
-              <a:t>2.2 Composición </a:t>
-            </a:r>
-            <a:r>
-              <a:rPr lang="es-ES" dirty="0"/>
-              <a:t>de la </a:t>
-            </a:r>
-            <a:r>
-              <a:rPr lang="es-ES" dirty="0" smtClean="0"/>
-              <a:t>muestra</a:t>
-            </a:r>
-          </a:p>
-          <a:p>
-            <a:pPr marL="457200" lvl="1" indent="0">
-              <a:buNone/>
-            </a:pPr>
-            <a:r>
-              <a:rPr lang="es-ES" dirty="0" smtClean="0"/>
-              <a:t>2.3 Correlación </a:t>
-            </a:r>
-            <a:r>
-              <a:rPr lang="es-ES" dirty="0"/>
-              <a:t>con las normas, las especificaciones técnicas y las herramientas utilizadas para el </a:t>
-            </a:r>
-            <a:r>
-              <a:rPr lang="es-ES" dirty="0" smtClean="0"/>
-              <a:t>seguimiento</a:t>
-            </a:r>
-          </a:p>
-          <a:p>
-            <a:pPr marL="514350" indent="-514350">
-              <a:buFont typeface="+mj-lt"/>
-              <a:buAutoNum type="arabicPeriod"/>
-            </a:pPr>
-            <a:r>
-              <a:rPr lang="es-ES" dirty="0" smtClean="0"/>
-              <a:t>Resultado del seguimiento</a:t>
-            </a:r>
-          </a:p>
-          <a:p>
-            <a:pPr marL="457200" lvl="1" indent="0">
-              <a:buNone/>
-            </a:pPr>
-            <a:r>
-              <a:rPr lang="es-ES" dirty="0" smtClean="0"/>
-              <a:t>3.1 Resultado detallado</a:t>
-            </a:r>
-          </a:p>
-          <a:p>
-            <a:pPr marL="457200" lvl="1" indent="0">
-              <a:buNone/>
-            </a:pPr>
-            <a:r>
-              <a:rPr lang="es-ES" dirty="0" smtClean="0"/>
-              <a:t>3.2 Contenido </a:t>
-            </a:r>
-            <a:r>
-              <a:rPr lang="es-ES" dirty="0"/>
-              <a:t>complementario (opcional</a:t>
-            </a:r>
-            <a:r>
-              <a:rPr lang="es-ES" dirty="0" smtClean="0"/>
-              <a:t>)</a:t>
-            </a:r>
-          </a:p>
-          <a:p>
-            <a:pPr marL="514350" indent="-514350">
-              <a:buFont typeface="+mj-lt"/>
-              <a:buAutoNum type="arabicPeriod"/>
-            </a:pPr>
-            <a:r>
-              <a:rPr lang="es-ES" dirty="0"/>
-              <a:t>U</a:t>
-            </a:r>
-            <a:r>
-              <a:rPr lang="es-ES" dirty="0" smtClean="0"/>
-              <a:t>so del procedimiento de aplicación y observaciones de los usuarios finales</a:t>
-            </a:r>
-          </a:p>
-          <a:p>
-            <a:pPr marL="514350" indent="-514350">
-              <a:buFont typeface="+mj-lt"/>
-              <a:buAutoNum type="arabicPeriod"/>
-            </a:pPr>
-            <a:r>
-              <a:rPr lang="es-ES" dirty="0"/>
-              <a:t>C</a:t>
-            </a:r>
-            <a:r>
-              <a:rPr lang="es-ES" dirty="0" smtClean="0"/>
-              <a:t>ontenido relacionado con medidas suplementarias</a:t>
-            </a:r>
-          </a:p>
-          <a:p>
-            <a:pPr marL="514350" indent="-514350">
-              <a:buFont typeface="+mj-lt"/>
-              <a:buAutoNum type="arabicPeriod"/>
-            </a:pPr>
-            <a:endParaRPr lang="es-ES" dirty="0" smtClean="0"/>
-          </a:p>
-        </p:txBody>
-      </p:sp>
-      <p:sp>
-        <p:nvSpPr>
-          <p:cNvPr id="4" name="Marcador de número de diapositiva 3"/>
-          <p:cNvSpPr>
-            <a:spLocks noGrp="1"/>
-          </p:cNvSpPr>
-          <p:nvPr>
-            <p:ph type="sldNum" sz="quarter" idx="12"/>
-          </p:nvPr>
-        </p:nvSpPr>
-        <p:spPr/>
-        <p:txBody>
-          <a:bodyPr/>
-          <a:lstStyle/>
-          <a:p>
-            <a:fld id="{C9400CC4-AA0F-4E2E-A7D9-25BF1D2A8A65}" type="slidenum">
-              <a:rPr lang="es-ES" smtClean="0"/>
-              <a:t>30</a:t>
-            </a:fld>
-            <a:endParaRPr lang="es-ES" dirty="0"/>
-          </a:p>
-        </p:txBody>
-      </p:sp>
-    </p:spTree>
-    <p:extLst>
-      <p:ext uri="{BB962C8B-B14F-4D97-AF65-F5344CB8AC3E}">
-        <p14:creationId xmlns:p14="http://schemas.microsoft.com/office/powerpoint/2010/main" val="3666564641"/>
-      </p:ext>
-    </p:extLst>
-  </p:cSld>
-  <p:clrMapOvr>
-    <a:masterClrMapping/>
-  </p:clrMapOvr>
-  <p:timing>
-    <p:tnLst>
-      <p:par>
-        <p:cTn id="1" dur="indefinite" restart="never" nodeType="tmRoot"/>
-      </p:par>
-    </p:tnLst>
-  </p:timing>
-</p:sld>
-</file>
-
-<file path=ppt/slides/slide31.xml><?xml version="1.0" encoding="utf-8"?>
-<p:sld xmlns:a="http://schemas.openxmlformats.org/drawingml/2006/main" xmlns:r="http://schemas.openxmlformats.org/officeDocument/2006/relationships" xmlns:p="http://schemas.openxmlformats.org/presentationml/2006/main">
-  <p:cSld>
-    <p:spTree>
-      <p:nvGrpSpPr>
-        <p:cNvPr id="1" name=""/>
-        <p:cNvGrpSpPr/>
-        <p:nvPr/>
-      </p:nvGrpSpPr>
-      <p:grpSpPr>
-        <a:xfrm>
-          <a:off x="0" y="0"/>
-          <a:ext cx="0" cy="0"/>
-          <a:chOff x="0" y="0"/>
-          <a:chExt cx="0" cy="0"/>
-        </a:xfrm>
-      </p:grpSpPr>
-      <p:sp>
-        <p:nvSpPr>
-          <p:cNvPr id="2" name="Título 1"/>
-          <p:cNvSpPr>
-            <a:spLocks noGrp="1"/>
-          </p:cNvSpPr>
-          <p:nvPr>
-            <p:ph type="title"/>
-          </p:nvPr>
-        </p:nvSpPr>
-        <p:spPr/>
-        <p:txBody>
-          <a:bodyPr>
-            <a:normAutofit/>
-          </a:bodyPr>
-          <a:lstStyle/>
-          <a:p>
-            <a:r>
-              <a:rPr lang="es-ES" dirty="0" smtClean="0"/>
-              <a:t>7.3 Informe de seguimiento</a:t>
-            </a:r>
             <a:br>
               <a:rPr lang="es-ES" dirty="0" smtClean="0"/>
             </a:br>
@@ -12323,7 +12120,7 @@
           <a:p>
             <a:fld id="{C9400CC4-AA0F-4E2E-A7D9-25BF1D2A8A65}" type="slidenum">
               <a:rPr lang="es-ES" smtClean="0"/>
-              <a:t>31</a:t>
+              <a:t>30</a:t>
             </a:fld>
             <a:endParaRPr lang="es-ES" dirty="0"/>
           </a:p>
@@ -12684,7 +12481,7 @@
 </p:sld>
 </file>
 
-<file path=ppt/slides/slide32.xml><?xml version="1.0" encoding="utf-8"?>
+<file path=ppt/slides/slide31.xml><?xml version="1.0" encoding="utf-8"?>
 <p:sld xmlns:a="http://schemas.openxmlformats.org/drawingml/2006/main" xmlns:r="http://schemas.openxmlformats.org/officeDocument/2006/relationships" xmlns:p="http://schemas.openxmlformats.org/presentationml/2006/main">
   <p:cSld>
     <p:spTree>
@@ -12883,7 +12680,7 @@
           <a:p>
             <a:fld id="{C9400CC4-AA0F-4E2E-A7D9-25BF1D2A8A65}" type="slidenum">
               <a:rPr lang="es-ES" smtClean="0"/>
-              <a:t>32</a:t>
+              <a:t>31</a:t>
             </a:fld>
             <a:endParaRPr lang="es-ES" dirty="0"/>
           </a:p>
@@ -13244,7 +13041,7 @@
 </p:sld>
 </file>
 
-<file path=ppt/slides/slide33.xml><?xml version="1.0" encoding="utf-8"?>
+<file path=ppt/slides/slide32.xml><?xml version="1.0" encoding="utf-8"?>
 <p:sld xmlns:a="http://schemas.openxmlformats.org/drawingml/2006/main" xmlns:r="http://schemas.openxmlformats.org/officeDocument/2006/relationships" xmlns:p="http://schemas.openxmlformats.org/presentationml/2006/main">
   <p:cSld>
     <p:spTree>
@@ -13362,7 +13159,7 @@
           <a:p>
             <a:fld id="{C9400CC4-AA0F-4E2E-A7D9-25BF1D2A8A65}" type="slidenum">
               <a:rPr lang="es-ES" smtClean="0"/>
-              <a:t>33</a:t>
+              <a:t>32</a:t>
             </a:fld>
             <a:endParaRPr lang="es-ES" dirty="0"/>
           </a:p>
@@ -13723,7 +13520,7 @@
 </p:sld>
 </file>
 
-<file path=ppt/slides/slide34.xml><?xml version="1.0" encoding="utf-8"?>
+<file path=ppt/slides/slide33.xml><?xml version="1.0" encoding="utf-8"?>
 <p:sld xmlns:a="http://schemas.openxmlformats.org/drawingml/2006/main" xmlns:r="http://schemas.openxmlformats.org/officeDocument/2006/relationships" xmlns:p="http://schemas.openxmlformats.org/presentationml/2006/main">
   <p:cSld>
     <p:spTree>
@@ -13894,7 +13691,7 @@
           <a:p>
             <a:fld id="{C9400CC4-AA0F-4E2E-A7D9-25BF1D2A8A65}" type="slidenum">
               <a:rPr lang="es-ES" smtClean="0"/>
-              <a:t>34</a:t>
+              <a:t>33</a:t>
             </a:fld>
             <a:endParaRPr lang="es-ES" dirty="0"/>
           </a:p>
@@ -14255,7 +14052,7 @@
 </p:sld>
 </file>
 
-<file path=ppt/slides/slide35.xml><?xml version="1.0" encoding="utf-8"?>
+<file path=ppt/slides/slide34.xml><?xml version="1.0" encoding="utf-8"?>
 <p:sld xmlns:a="http://schemas.openxmlformats.org/drawingml/2006/main" xmlns:r="http://schemas.openxmlformats.org/officeDocument/2006/relationships" xmlns:p="http://schemas.openxmlformats.org/presentationml/2006/main">
   <p:cSld>
     <p:spTree>
@@ -14476,7 +14273,7 @@
           <a:p>
             <a:fld id="{C9400CC4-AA0F-4E2E-A7D9-25BF1D2A8A65}" type="slidenum">
               <a:rPr lang="es-ES" smtClean="0"/>
-              <a:t>35</a:t>
+              <a:t>34</a:t>
             </a:fld>
             <a:endParaRPr lang="es-ES" dirty="0"/>
           </a:p>
@@ -14837,6 +14634,192 @@
 </p:sld>
 </file>
 
+<file path=ppt/slides/slide35.xml><?xml version="1.0" encoding="utf-8"?>
+<p:sld xmlns:a="http://schemas.openxmlformats.org/drawingml/2006/main" xmlns:r="http://schemas.openxmlformats.org/officeDocument/2006/relationships" xmlns:p="http://schemas.openxmlformats.org/presentationml/2006/main">
+  <p:cSld>
+    <p:spTree>
+      <p:nvGrpSpPr>
+        <p:cNvPr id="1" name=""/>
+        <p:cNvGrpSpPr/>
+        <p:nvPr/>
+      </p:nvGrpSpPr>
+      <p:grpSpPr>
+        <a:xfrm>
+          <a:off x="0" y="0"/>
+          <a:ext cx="0" cy="0"/>
+          <a:chOff x="0" y="0"/>
+          <a:chExt cx="0" cy="0"/>
+        </a:xfrm>
+      </p:grpSpPr>
+      <p:sp>
+        <p:nvSpPr>
+          <p:cNvPr id="2" name="Título 1"/>
+          <p:cNvSpPr>
+            <a:spLocks noGrp="1"/>
+          </p:cNvSpPr>
+          <p:nvPr>
+            <p:ph type="title"/>
+          </p:nvPr>
+        </p:nvSpPr>
+        <p:spPr/>
+        <p:txBody>
+          <a:bodyPr>
+            <a:normAutofit/>
+          </a:bodyPr>
+          <a:lstStyle/>
+          <a:p>
+            <a:r>
+              <a:rPr lang="es-ES" dirty="0" smtClean="0"/>
+              <a:t>7.3 Informe de seguimiento</a:t>
+            </a:r>
+            <a:br>
+              <a:rPr lang="es-ES" dirty="0" smtClean="0"/>
+            </a:br>
+            <a:r>
+              <a:rPr lang="es-ES" dirty="0" smtClean="0"/>
+              <a:t>Frecuencia de presentación</a:t>
+            </a:r>
+            <a:endParaRPr lang="es-ES" dirty="0"/>
+          </a:p>
+        </p:txBody>
+      </p:sp>
+      <p:sp>
+        <p:nvSpPr>
+          <p:cNvPr id="3" name="Marcador de contenido 2"/>
+          <p:cNvSpPr>
+            <a:spLocks noGrp="1"/>
+          </p:cNvSpPr>
+          <p:nvPr>
+            <p:ph idx="1"/>
+          </p:nvPr>
+        </p:nvSpPr>
+        <p:spPr/>
+        <p:txBody>
+          <a:bodyPr>
+            <a:normAutofit lnSpcReduction="10000"/>
+          </a:bodyPr>
+          <a:lstStyle/>
+          <a:p>
+            <a:r>
+              <a:rPr lang="es-ES" dirty="0"/>
+              <a:t>El primer informe abarcará </a:t>
+            </a:r>
+            <a:r>
+              <a:rPr lang="es-ES" dirty="0" smtClean="0"/>
+              <a:t>desde </a:t>
+            </a:r>
+            <a:r>
+              <a:rPr lang="es-ES" dirty="0"/>
+              <a:t>el 23 de junio de 2021 hasta el 22 de diciembre de </a:t>
+            </a:r>
+            <a:r>
+              <a:rPr lang="es-ES" dirty="0" smtClean="0"/>
+              <a:t>2021.</a:t>
+            </a:r>
+          </a:p>
+          <a:p>
+            <a:pPr lvl="1"/>
+            <a:r>
+              <a:rPr lang="es-ES" dirty="0"/>
+              <a:t>Durante el primer período, el seguimiento de las </a:t>
+            </a:r>
+            <a:r>
+              <a:rPr lang="es-ES" dirty="0" smtClean="0"/>
+              <a:t>apps </a:t>
+            </a:r>
+            <a:r>
+              <a:rPr lang="es-ES" dirty="0"/>
+              <a:t>comprenderá los resultados a partir de una muestra reducida de dichas </a:t>
+            </a:r>
+            <a:r>
+              <a:rPr lang="es-ES" dirty="0" smtClean="0"/>
+              <a:t>aplicaciones, como </a:t>
+            </a:r>
+            <a:r>
+              <a:rPr lang="es-ES" dirty="0"/>
+              <a:t>mínimo, de un tercio del número </a:t>
+            </a:r>
+            <a:r>
+              <a:rPr lang="es-ES" dirty="0" smtClean="0"/>
+              <a:t>establecido (España: 52/3 = mín. 18 apps).</a:t>
+            </a:r>
+          </a:p>
+          <a:p>
+            <a:pPr lvl="1"/>
+            <a:r>
+              <a:rPr lang="es-ES" dirty="0" smtClean="0"/>
+              <a:t>Plazo de presentación a la Comisión Europea: 23 de diciembre de 2021.</a:t>
+            </a:r>
+          </a:p>
+          <a:p>
+            <a:r>
+              <a:rPr lang="es-ES" dirty="0" smtClean="0"/>
+              <a:t>A </a:t>
+            </a:r>
+            <a:r>
+              <a:rPr lang="es-ES" dirty="0"/>
+              <a:t>partir de entonces, </a:t>
+            </a:r>
+            <a:r>
+              <a:rPr lang="es-ES" dirty="0" smtClean="0"/>
+              <a:t>cada 3 años</a:t>
+            </a:r>
+          </a:p>
+          <a:p>
+            <a:r>
+              <a:rPr lang="es-ES" dirty="0"/>
+              <a:t>El órgano encargado de realizar el seguimiento y presentación de informes ante la Comisión Europea es el Ministerio de Política Territorial y Función </a:t>
+            </a:r>
+            <a:r>
+              <a:rPr lang="es-ES" dirty="0" smtClean="0"/>
+              <a:t>Pública</a:t>
+            </a:r>
+          </a:p>
+        </p:txBody>
+      </p:sp>
+      <p:sp>
+        <p:nvSpPr>
+          <p:cNvPr id="4" name="Marcador de número de diapositiva 3"/>
+          <p:cNvSpPr>
+            <a:spLocks noGrp="1"/>
+          </p:cNvSpPr>
+          <p:nvPr>
+            <p:ph type="sldNum" sz="quarter" idx="12"/>
+          </p:nvPr>
+        </p:nvSpPr>
+        <p:spPr/>
+        <p:txBody>
+          <a:bodyPr/>
+          <a:lstStyle/>
+          <a:p>
+            <a:fld id="{C9400CC4-AA0F-4E2E-A7D9-25BF1D2A8A65}" type="slidenum">
+              <a:rPr lang="es-ES" smtClean="0"/>
+              <a:t>35</a:t>
+            </a:fld>
+            <a:endParaRPr lang="es-ES" dirty="0"/>
+          </a:p>
+        </p:txBody>
+      </p:sp>
+    </p:spTree>
+    <p:extLst>
+      <p:ext uri="{BB962C8B-B14F-4D97-AF65-F5344CB8AC3E}">
+        <p14:creationId xmlns:p14="http://schemas.microsoft.com/office/powerpoint/2010/main" val="1849943147"/>
+      </p:ext>
+    </p:extLst>
+  </p:cSld>
+  <p:clrMapOvr>
+    <a:masterClrMapping/>
+  </p:clrMapOvr>
+  <p:timing>
+    <p:tnLst>
+      <p:par>
+        <p:cTn id="1" dur="indefinite" restart="never" nodeType="tmRoot"/>
+      </p:par>
+    </p:tnLst>
+  </p:timing>
+</p:sld>
+</file>
+
 <file path=ppt/slides/slide36.xml><?xml version="1.0" encoding="utf-8"?>
 <p:sld xmlns:a="http://schemas.openxmlformats.org/drawingml/2006/main" xmlns:r="http://schemas.openxmlformats.org/officeDocument/2006/relationships" xmlns:p="http://schemas.openxmlformats.org/presentationml/2006/main">
   <p:cSld>
@@ -14867,116 +14850,145 @@
         <p:spPr/>
         <p:txBody>
           <a:bodyPr>
-            <a:normAutofit/>
+            <a:normAutofit fontScale="90000"/>
           </a:bodyPr>
           <a:lstStyle/>
           <a:p>
             <a:r>
-              <a:rPr lang="es-ES" dirty="0" smtClean="0"/>
-              <a:t>7.3 Informe de seguimiento</a:t>
-            </a:r>
-            <a:br>
-              <a:rPr lang="es-ES" dirty="0" smtClean="0"/>
-            </a:br>
-            <a:r>
-              <a:rPr lang="es-ES" dirty="0" smtClean="0"/>
-              <a:t>Frecuencia de presentación</a:t>
-            </a:r>
+              <a:rPr lang="es-ES" dirty="0"/>
+              <a:t>Accesibilidad de aplicaciones para dispositivos móviles aplicando el RD 1112/2018 y la Directiva (UE) 2016/2102</a:t>
+            </a:r>
+          </a:p>
+        </p:txBody>
+      </p:sp>
+      <p:sp>
+        <p:nvSpPr>
+          <p:cNvPr id="3" name="Marcador de contenido 2"/>
+          <p:cNvSpPr>
+            <a:spLocks noGrp="1"/>
+          </p:cNvSpPr>
+          <p:nvPr>
+            <p:ph idx="1"/>
+          </p:nvPr>
+        </p:nvSpPr>
+        <p:spPr/>
+        <p:txBody>
+          <a:bodyPr>
+            <a:normAutofit fontScale="92500" lnSpcReduction="20000"/>
+          </a:bodyPr>
+          <a:lstStyle/>
+          <a:p>
+            <a:pPr marL="514350" indent="-514350">
+              <a:buFont typeface="+mj-lt"/>
+              <a:buAutoNum type="arabicPeriod"/>
+            </a:pPr>
+            <a:r>
+              <a:rPr lang="es-ES" dirty="0" smtClean="0"/>
+              <a:t>Objeto del RD 112/2018</a:t>
+            </a:r>
+          </a:p>
+          <a:p>
+            <a:pPr marL="514350" indent="-514350">
+              <a:buFont typeface="+mj-lt"/>
+              <a:buAutoNum type="arabicPeriod"/>
+            </a:pPr>
+            <a:r>
+              <a:rPr lang="es-ES" dirty="0" smtClean="0"/>
+              <a:t>Plazos</a:t>
+            </a:r>
+          </a:p>
+          <a:p>
+            <a:pPr marL="514350" indent="-514350">
+              <a:buFont typeface="+mj-lt"/>
+              <a:buAutoNum type="arabicPeriod"/>
+            </a:pPr>
+            <a:r>
+              <a:rPr lang="es-ES" dirty="0" smtClean="0"/>
+              <a:t>Mecanismos de comunicación de los usuarios</a:t>
+            </a:r>
+          </a:p>
+          <a:p>
+            <a:pPr marL="514350" indent="-514350">
+              <a:buFont typeface="+mj-lt"/>
+              <a:buAutoNum type="arabicPeriod"/>
+            </a:pPr>
+            <a:r>
+              <a:rPr lang="es-ES" dirty="0" smtClean="0"/>
+              <a:t>Revisiones de accesibilidad</a:t>
+            </a:r>
+          </a:p>
+          <a:p>
+            <a:pPr marL="514350" indent="-514350">
+              <a:buFont typeface="+mj-lt"/>
+              <a:buAutoNum type="arabicPeriod"/>
+            </a:pPr>
+            <a:r>
+              <a:rPr lang="es-ES" dirty="0" smtClean="0"/>
+              <a:t>Estándares de aplicación</a:t>
+            </a:r>
+          </a:p>
+          <a:p>
+            <a:pPr marL="514350" indent="-514350">
+              <a:buFont typeface="+mj-lt"/>
+              <a:buAutoNum type="arabicPeriod"/>
+            </a:pPr>
+            <a:r>
+              <a:rPr lang="es-ES" dirty="0"/>
+              <a:t>Modelo de </a:t>
+            </a:r>
+            <a:r>
+              <a:rPr lang="es-ES" dirty="0" smtClean="0"/>
+              <a:t>declaración </a:t>
+            </a:r>
+            <a:r>
+              <a:rPr lang="es-ES" dirty="0"/>
+              <a:t>de </a:t>
+            </a:r>
+            <a:r>
+              <a:rPr lang="es-ES" dirty="0" smtClean="0"/>
+              <a:t>accesibilidad</a:t>
+            </a:r>
+          </a:p>
+          <a:p>
+            <a:pPr marL="514350" indent="-514350">
+              <a:buFont typeface="+mj-lt"/>
+              <a:buAutoNum type="arabicPeriod"/>
+            </a:pPr>
+            <a:r>
+              <a:rPr lang="es-ES" dirty="0"/>
+              <a:t>Seguimiento y presentación de </a:t>
+            </a:r>
+            <a:r>
+              <a:rPr lang="es-ES" dirty="0" smtClean="0"/>
+              <a:t>informes</a:t>
+            </a:r>
+          </a:p>
+          <a:p>
+            <a:pPr marL="514350" indent="-514350">
+              <a:buFont typeface="+mj-lt"/>
+              <a:buAutoNum type="arabicPeriod"/>
+            </a:pPr>
+            <a:r>
+              <a:rPr lang="es-ES" dirty="0" smtClean="0"/>
+              <a:t>Unidades responsables de accesibilidad</a:t>
+            </a:r>
+          </a:p>
+          <a:p>
+            <a:pPr marL="514350" indent="-514350">
+              <a:buFont typeface="+mj-lt"/>
+              <a:buAutoNum type="arabicPeriod"/>
+            </a:pPr>
+            <a:r>
+              <a:rPr lang="es-ES" dirty="0"/>
+              <a:t>Futura legislación: Directiva (UE) </a:t>
+            </a:r>
+            <a:r>
+              <a:rPr lang="es-ES" dirty="0" smtClean="0"/>
+              <a:t>2019/882</a:t>
+            </a:r>
+          </a:p>
+          <a:p>
             <a:endParaRPr lang="es-ES" dirty="0"/>
-          </a:p>
-        </p:txBody>
-      </p:sp>
-      <p:sp>
-        <p:nvSpPr>
-          <p:cNvPr id="3" name="Marcador de contenido 2"/>
-          <p:cNvSpPr>
-            <a:spLocks noGrp="1"/>
-          </p:cNvSpPr>
-          <p:nvPr>
-            <p:ph idx="1"/>
-          </p:nvPr>
-        </p:nvSpPr>
-        <p:spPr/>
-        <p:txBody>
-          <a:bodyPr>
-            <a:normAutofit lnSpcReduction="10000"/>
-          </a:bodyPr>
-          <a:lstStyle/>
-          <a:p>
-            <a:r>
-              <a:rPr lang="es-ES" dirty="0"/>
-              <a:t>El primer informe abarcará </a:t>
-            </a:r>
-            <a:r>
-              <a:rPr lang="es-ES" dirty="0" smtClean="0"/>
-              <a:t>desde </a:t>
-            </a:r>
-            <a:r>
-              <a:rPr lang="es-ES" dirty="0"/>
-              <a:t>el 23 de junio de 2021 hasta el 22 de diciembre de </a:t>
-            </a:r>
-            <a:r>
-              <a:rPr lang="es-ES" dirty="0" smtClean="0"/>
-              <a:t>2021.</a:t>
-            </a:r>
-          </a:p>
-          <a:p>
-            <a:pPr lvl="1"/>
-            <a:r>
-              <a:rPr lang="es-ES" dirty="0"/>
-              <a:t>Durante el primer período, el seguimiento de las </a:t>
-            </a:r>
-            <a:r>
-              <a:rPr lang="es-ES" dirty="0" smtClean="0"/>
-              <a:t>apps </a:t>
-            </a:r>
-            <a:r>
-              <a:rPr lang="es-ES" dirty="0"/>
-              <a:t>comprenderá los resultados a partir de una muestra reducida de dichas </a:t>
-            </a:r>
-            <a:r>
-              <a:rPr lang="es-ES" dirty="0" smtClean="0"/>
-              <a:t>aplicaciones, como </a:t>
-            </a:r>
-            <a:r>
-              <a:rPr lang="es-ES" dirty="0"/>
-              <a:t>mínimo, de un tercio del número </a:t>
-            </a:r>
-            <a:r>
-              <a:rPr lang="es-ES" dirty="0" smtClean="0"/>
-              <a:t>establecido (España: 52/3 = mín. 18 apps).</a:t>
-            </a:r>
-          </a:p>
-          <a:p>
-            <a:pPr lvl="1"/>
-            <a:r>
-              <a:rPr lang="es-ES" dirty="0" smtClean="0"/>
-              <a:t>Plazo de presentación a la Comisión Europea: 23 de diciembre de 2021.</a:t>
-            </a:r>
-          </a:p>
-          <a:p>
-            <a:r>
-              <a:rPr lang="es-ES" dirty="0" smtClean="0"/>
-              <a:t>A </a:t>
-            </a:r>
-            <a:r>
-              <a:rPr lang="es-ES" dirty="0"/>
-              <a:t>partir de entonces, </a:t>
-            </a:r>
-            <a:r>
-              <a:rPr lang="es-ES" dirty="0" smtClean="0"/>
-              <a:t>cada 3 años</a:t>
-            </a:r>
-          </a:p>
-          <a:p>
-            <a:r>
-              <a:rPr lang="es-ES" dirty="0"/>
-              <a:t>El órgano encargado de realizar el seguimiento y presentación de informes ante la Comisión Europea es el Ministerio de Política Territorial y Función </a:t>
-            </a:r>
-            <a:r>
-              <a:rPr lang="es-ES" dirty="0" smtClean="0"/>
-              <a:t>Pública</a:t>
-            </a:r>
           </a:p>
         </p:txBody>
       </p:sp>
@@ -15003,10 +15015,50 @@
           </a:p>
         </p:txBody>
       </p:sp>
+      <p:sp>
+        <p:nvSpPr>
+          <p:cNvPr id="5" name="Flecha derecha 4" title="&quot;&quot;"/>
+          <p:cNvSpPr/>
+          <p:nvPr/>
+        </p:nvSpPr>
+        <p:spPr>
+          <a:xfrm>
+            <a:off x="674456" y="5267948"/>
+            <a:ext cx="487018" cy="278296"/>
+          </a:xfrm>
+          <a:prstGeom prst="rightArrow">
+            <a:avLst/>
+          </a:prstGeom>
+        </p:spPr>
+        <p:style>
+          <a:lnRef idx="2">
+            <a:schemeClr val="accent1">
+              <a:shade val="50000"/>
+            </a:schemeClr>
+          </a:lnRef>
+          <a:fillRef idx="1">
+            <a:schemeClr val="accent1"/>
+          </a:fillRef>
+          <a:effectRef idx="0">
+            <a:schemeClr val="accent1"/>
+          </a:effectRef>
+          <a:fontRef idx="minor">
+            <a:schemeClr val="lt1"/>
+          </a:fontRef>
+        </p:style>
+        <p:txBody>
+          <a:bodyPr rtlCol="0" anchor="ctr"/>
+          <a:lstStyle/>
+          <a:p>
+            <a:pPr algn="ctr"/>
+            <a:endParaRPr lang="es-ES"/>
+          </a:p>
+        </p:txBody>
+      </p:sp>
     </p:spTree>
     <p:extLst>
       <p:ext uri="{BB962C8B-B14F-4D97-AF65-F5344CB8AC3E}">
-        <p14:creationId xmlns:p14="http://schemas.microsoft.com/office/powerpoint/2010/main" val="1849943147"/>
+        <p14:creationId xmlns:p14="http://schemas.microsoft.com/office/powerpoint/2010/main" val="2545292763"/>
       </p:ext>
     </p:extLst>
   </p:cSld>
@@ -15052,146 +15104,88 @@
         </p:nvSpPr>
         <p:spPr/>
         <p:txBody>
+          <a:bodyPr/>
+          <a:lstStyle/>
+          <a:p>
+            <a:r>
+              <a:rPr lang="es-ES" dirty="0" smtClean="0"/>
+              <a:t>8. </a:t>
+            </a:r>
+            <a:r>
+              <a:rPr lang="es-ES" dirty="0"/>
+              <a:t>Unidades responsables de </a:t>
+            </a:r>
+            <a:r>
+              <a:rPr lang="es-ES" dirty="0" smtClean="0"/>
+              <a:t>accesibilidad</a:t>
+            </a:r>
+            <a:endParaRPr lang="es-ES" dirty="0"/>
+          </a:p>
+        </p:txBody>
+      </p:sp>
+      <p:sp>
+        <p:nvSpPr>
+          <p:cNvPr id="3" name="Marcador de contenido 2"/>
+          <p:cNvSpPr>
+            <a:spLocks noGrp="1"/>
+          </p:cNvSpPr>
+          <p:nvPr>
+            <p:ph idx="1"/>
+          </p:nvPr>
+        </p:nvSpPr>
+        <p:spPr/>
+        <p:txBody>
           <a:bodyPr>
-            <a:normAutofit fontScale="90000"/>
+            <a:normAutofit fontScale="77500" lnSpcReduction="20000"/>
           </a:bodyPr>
           <a:lstStyle/>
           <a:p>
             <a:r>
-              <a:rPr lang="es-ES" dirty="0"/>
-              <a:t>Accesibilidad de aplicaciones para dispositivos móviles aplicando el RD 1112/2018 y la Directiva (UE) 2016/2102</a:t>
-            </a:r>
-          </a:p>
-        </p:txBody>
-      </p:sp>
-      <p:sp>
-        <p:nvSpPr>
-          <p:cNvPr id="3" name="Marcador de contenido 2"/>
-          <p:cNvSpPr>
-            <a:spLocks noGrp="1"/>
-          </p:cNvSpPr>
-          <p:nvPr>
-            <p:ph idx="1"/>
-          </p:nvPr>
-        </p:nvSpPr>
-        <p:spPr/>
-        <p:txBody>
-          <a:bodyPr>
-            <a:normAutofit fontScale="92500" lnSpcReduction="20000"/>
-          </a:bodyPr>
-          <a:lstStyle/>
-          <a:p>
-            <a:pPr marL="514350" indent="-514350">
-              <a:buFont typeface="+mj-lt"/>
-              <a:buAutoNum type="arabicPeriod"/>
-            </a:pPr>
-            <a:r>
-              <a:rPr lang="es-ES" dirty="0" smtClean="0"/>
-              <a:t>Objeto del RD 112/2018</a:t>
-            </a:r>
-          </a:p>
-          <a:p>
-            <a:pPr marL="514350" indent="-514350">
-              <a:buFont typeface="+mj-lt"/>
-              <a:buAutoNum type="arabicPeriod"/>
-            </a:pPr>
-            <a:r>
-              <a:rPr lang="es-ES" dirty="0" smtClean="0"/>
-              <a:t>Plazos</a:t>
-            </a:r>
-          </a:p>
-          <a:p>
-            <a:pPr marL="514350" indent="-514350">
-              <a:buFont typeface="+mj-lt"/>
-              <a:buAutoNum type="arabicPeriod"/>
-            </a:pPr>
-            <a:r>
-              <a:rPr lang="es-ES" dirty="0" smtClean="0"/>
-              <a:t>Mecanismos de comunicación de los usuarios</a:t>
-            </a:r>
-          </a:p>
-          <a:p>
-            <a:pPr marL="514350" indent="-514350">
-              <a:buFont typeface="+mj-lt"/>
-              <a:buAutoNum type="arabicPeriod"/>
-            </a:pPr>
-            <a:r>
-              <a:rPr lang="es-ES" dirty="0" smtClean="0"/>
-              <a:t>Revisiones de accesibilidad</a:t>
-            </a:r>
-          </a:p>
-          <a:p>
-            <a:pPr marL="514350" indent="-514350">
-              <a:buFont typeface="+mj-lt"/>
-              <a:buAutoNum type="arabicPeriod"/>
-            </a:pPr>
-            <a:r>
-              <a:rPr lang="es-ES" dirty="0" smtClean="0"/>
-              <a:t>Estándares de aplicación</a:t>
-            </a:r>
-          </a:p>
-          <a:p>
-            <a:pPr marL="514350" indent="-514350">
-              <a:buFont typeface="+mj-lt"/>
-              <a:buAutoNum type="arabicPeriod"/>
-            </a:pPr>
-            <a:r>
-              <a:rPr lang="es-ES" dirty="0"/>
-              <a:t>Modelo de </a:t>
-            </a:r>
-            <a:r>
-              <a:rPr lang="es-ES" dirty="0" smtClean="0"/>
-              <a:t>declaración </a:t>
-            </a:r>
-            <a:r>
-              <a:rPr lang="es-ES" dirty="0"/>
-              <a:t>de </a:t>
-            </a:r>
-            <a:r>
-              <a:rPr lang="es-ES" dirty="0" smtClean="0"/>
-              <a:t>accesibilidad</a:t>
-            </a:r>
-          </a:p>
-          <a:p>
-            <a:pPr marL="514350" indent="-514350">
-              <a:buFont typeface="+mj-lt"/>
-              <a:buAutoNum type="arabicPeriod"/>
-            </a:pPr>
-            <a:r>
-              <a:rPr lang="es-ES" dirty="0"/>
-              <a:t>Seguimiento y presentación de </a:t>
-            </a:r>
-            <a:r>
-              <a:rPr lang="es-ES" dirty="0" smtClean="0"/>
-              <a:t>informes</a:t>
-            </a:r>
-          </a:p>
-          <a:p>
-            <a:pPr marL="514350" indent="-514350">
-              <a:buFont typeface="+mj-lt"/>
-              <a:buAutoNum type="arabicPeriod"/>
-            </a:pPr>
-            <a:r>
-              <a:rPr lang="es-ES" dirty="0" smtClean="0"/>
-              <a:t>Unidades responsables de accesibilidad</a:t>
-            </a:r>
-          </a:p>
-          <a:p>
-            <a:pPr marL="514350" indent="-514350">
-              <a:buFont typeface="+mj-lt"/>
-              <a:buAutoNum type="arabicPeriod"/>
-            </a:pPr>
-            <a:r>
-              <a:rPr lang="es-ES" dirty="0"/>
-              <a:t>Futura legislación: Directiva (UE) </a:t>
-            </a:r>
-            <a:r>
-              <a:rPr lang="es-ES" dirty="0" smtClean="0"/>
-              <a:t>2019/882</a:t>
-            </a:r>
-          </a:p>
-          <a:p>
-            <a:endParaRPr lang="es-ES" dirty="0"/>
+              <a:rPr lang="es-ES" dirty="0" smtClean="0"/>
+              <a:t>Art. 16. Cada </a:t>
+            </a:r>
+            <a:r>
+              <a:rPr lang="es-ES" dirty="0"/>
+              <a:t>entidad obligada determinará la Unidad responsable de garantizar el cumplimiento de los requisitos de accesibilidad de los sitios web y aplicaciones para dispositivos </a:t>
+            </a:r>
+            <a:r>
+              <a:rPr lang="es-ES" dirty="0" smtClean="0"/>
+              <a:t>móviles </a:t>
+            </a:r>
+            <a:r>
+              <a:rPr lang="es-ES" dirty="0"/>
+              <a:t>dentro de su ámbito competencial.</a:t>
+            </a:r>
+          </a:p>
+          <a:p>
+            <a:r>
+              <a:rPr lang="es-ES" dirty="0"/>
+              <a:t>En la Administración General del Estado se designarán las Unidades responsables de accesibilidad en el ámbito de las Subsecretarías de cada Departamento considerando todos los posibles organismos públicos y entidades de derecho público dependientes de ese Departamento</a:t>
+            </a:r>
+            <a:r>
+              <a:rPr lang="es-ES" dirty="0" smtClean="0"/>
+              <a:t>.</a:t>
+            </a:r>
+          </a:p>
+          <a:p>
+            <a:r>
+              <a:rPr lang="es-ES" dirty="0"/>
+              <a:t>En las c</a:t>
+            </a:r>
+            <a:r>
+              <a:rPr lang="es-ES" dirty="0" smtClean="0"/>
+              <a:t>omunidades autónomas </a:t>
+            </a:r>
+            <a:r>
+              <a:rPr lang="es-ES" dirty="0"/>
+              <a:t>se designará la Unidad responsable de accesibilidad para todo el ámbito autonómico.</a:t>
+            </a:r>
+          </a:p>
+          <a:p>
+            <a:r>
+              <a:rPr lang="es-ES" dirty="0"/>
+              <a:t>En las entidades locales y demás organismos obligados se designará, conforme a sus características organizativas propias, la Unidad responsable de accesibilidad de su ámbito.</a:t>
+            </a:r>
           </a:p>
         </p:txBody>
       </p:sp>
@@ -15218,50 +15212,10 @@
           </a:p>
         </p:txBody>
       </p:sp>
-      <p:sp>
-        <p:nvSpPr>
-          <p:cNvPr id="5" name="Flecha derecha 4" title="&quot;&quot;"/>
-          <p:cNvSpPr/>
-          <p:nvPr/>
-        </p:nvSpPr>
-        <p:spPr>
-          <a:xfrm>
-            <a:off x="674456" y="5267948"/>
-            <a:ext cx="487018" cy="278296"/>
-          </a:xfrm>
-          <a:prstGeom prst="rightArrow">
-            <a:avLst/>
-          </a:prstGeom>
-        </p:spPr>
-        <p:style>
-          <a:lnRef idx="2">
-            <a:schemeClr val="accent1">
-              <a:shade val="50000"/>
-            </a:schemeClr>
-          </a:lnRef>
-          <a:fillRef idx="1">
-            <a:schemeClr val="accent1"/>
-          </a:fillRef>
-          <a:effectRef idx="0">
-            <a:schemeClr val="accent1"/>
-          </a:effectRef>
-          <a:fontRef idx="minor">
-            <a:schemeClr val="lt1"/>
-          </a:fontRef>
-        </p:style>
-        <p:txBody>
-          <a:bodyPr rtlCol="0" anchor="ctr"/>
-          <a:lstStyle/>
-          <a:p>
-            <a:pPr algn="ctr"/>
-            <a:endParaRPr lang="es-ES"/>
-          </a:p>
-        </p:txBody>
-      </p:sp>
     </p:spTree>
     <p:extLst>
       <p:ext uri="{BB962C8B-B14F-4D97-AF65-F5344CB8AC3E}">
-        <p14:creationId xmlns:p14="http://schemas.microsoft.com/office/powerpoint/2010/main" val="2545292763"/>
+        <p14:creationId xmlns:p14="http://schemas.microsoft.com/office/powerpoint/2010/main" val="3134182807"/>
       </p:ext>
     </p:extLst>
   </p:cSld>
@@ -15322,6 +15276,13 @@
               <a:rPr lang="es-ES" dirty="0" smtClean="0"/>
               <a:t>accesibilidad</a:t>
             </a:r>
+            <a:br>
+              <a:rPr lang="es-ES" dirty="0" smtClean="0"/>
+            </a:br>
+            <a:r>
+              <a:rPr lang="es-ES" dirty="0" smtClean="0"/>
+              <a:t>Red de contactos</a:t>
+            </a:r>
             <a:endParaRPr lang="es-ES" dirty="0"/>
           </a:p>
         </p:txBody>
@@ -15343,52 +15304,111 @@
           </a:bodyPr>
           <a:lstStyle/>
           <a:p>
-            <a:r>
-              <a:rPr lang="es-ES" dirty="0" smtClean="0"/>
-              <a:t>Art. 16. Cada </a:t>
-            </a:r>
-            <a:r>
-              <a:rPr lang="es-ES" dirty="0"/>
-              <a:t>entidad obligada determinará la Unidad responsable de garantizar el cumplimiento de los requisitos de accesibilidad de los sitios web y aplicaciones para dispositivos </a:t>
-            </a:r>
-            <a:r>
-              <a:rPr lang="es-ES" dirty="0" smtClean="0"/>
-              <a:t>móviles </a:t>
-            </a:r>
-            <a:r>
-              <a:rPr lang="es-ES" dirty="0"/>
-              <a:t>dentro de su ámbito competencial.</a:t>
-            </a:r>
-          </a:p>
-          <a:p>
-            <a:r>
-              <a:rPr lang="es-ES" dirty="0"/>
-              <a:t>En la Administración General del Estado se designarán las Unidades responsables de accesibilidad en el ámbito de las Subsecretarías de cada Departamento considerando todos los posibles organismos públicos y entidades de derecho público dependientes de ese Departamento</a:t>
-            </a:r>
-            <a:r>
-              <a:rPr lang="es-ES" dirty="0" smtClean="0"/>
-              <a:t>.</a:t>
-            </a:r>
-          </a:p>
-          <a:p>
-            <a:r>
-              <a:rPr lang="es-ES" dirty="0"/>
-              <a:t>En las c</a:t>
-            </a:r>
-            <a:r>
-              <a:rPr lang="es-ES" dirty="0" smtClean="0"/>
-              <a:t>omunidades autónomas </a:t>
-            </a:r>
-            <a:r>
-              <a:rPr lang="es-ES" dirty="0"/>
-              <a:t>se designará la Unidad responsable de accesibilidad para todo el ámbito autonómico.</a:t>
-            </a:r>
-          </a:p>
-          <a:p>
-            <a:r>
-              <a:rPr lang="es-ES" dirty="0"/>
-              <a:t>En las entidades locales y demás organismos obligados se designará, conforme a sus características organizativas propias, la Unidad responsable de accesibilidad de su ámbito.</a:t>
-            </a:r>
+            <a:pPr marL="0" indent="0">
+              <a:buNone/>
+            </a:pPr>
+            <a:r>
+              <a:rPr lang="es-ES" dirty="0" smtClean="0"/>
+              <a:t>Art. 20</a:t>
+            </a:r>
+            <a:r>
+              <a:rPr lang="es-ES" dirty="0"/>
+              <a:t>. Se crea la Red de Contactos de Accesibilidad Digital de las Administraciones Públicas con funciones de asistencia al Ministerio de Política Territorial y Función </a:t>
+            </a:r>
+            <a:r>
+              <a:rPr lang="es-ES" dirty="0" smtClean="0"/>
+              <a:t>Pública, compuesta por:</a:t>
+            </a:r>
+          </a:p>
+          <a:p>
+            <a:r>
+              <a:rPr lang="es-ES" dirty="0"/>
+              <a:t>Las personas titulares de las Unidades responsables de </a:t>
+            </a:r>
+            <a:r>
+              <a:rPr lang="es-ES" dirty="0" smtClean="0"/>
+              <a:t>accesibilidad de </a:t>
+            </a:r>
+            <a:r>
+              <a:rPr lang="es-ES" dirty="0"/>
+              <a:t>la </a:t>
+            </a:r>
+            <a:r>
+              <a:rPr lang="es-ES" dirty="0" smtClean="0"/>
+              <a:t>AGE y CCAA.</a:t>
+            </a:r>
+            <a:endParaRPr lang="es-ES" dirty="0"/>
+          </a:p>
+          <a:p>
+            <a:r>
+              <a:rPr lang="es-ES" dirty="0" smtClean="0"/>
+              <a:t>Al </a:t>
+            </a:r>
+            <a:r>
+              <a:rPr lang="es-ES" dirty="0"/>
+              <a:t>menos un punto de contacto provincial que agrupará a las entidades locales de esa </a:t>
+            </a:r>
+            <a:r>
+              <a:rPr lang="es-ES" dirty="0" smtClean="0"/>
+              <a:t>provincia.</a:t>
+            </a:r>
+            <a:endParaRPr lang="es-ES" dirty="0"/>
+          </a:p>
+          <a:p>
+            <a:r>
+              <a:rPr lang="es-ES" dirty="0" smtClean="0"/>
+              <a:t>Una </a:t>
+            </a:r>
+            <a:r>
+              <a:rPr lang="es-ES" dirty="0"/>
+              <a:t>persona </a:t>
+            </a:r>
+            <a:r>
+              <a:rPr lang="es-ES" dirty="0" smtClean="0"/>
+              <a:t>designada por la </a:t>
+            </a:r>
+            <a:r>
+              <a:rPr lang="es-ES" dirty="0"/>
+              <a:t>Conferencia de Rectores para las Universidades </a:t>
+            </a:r>
+            <a:r>
+              <a:rPr lang="es-ES" dirty="0" smtClean="0"/>
+              <a:t>españolas.</a:t>
+            </a:r>
+            <a:endParaRPr lang="es-ES" dirty="0"/>
+          </a:p>
+          <a:p>
+            <a:r>
+              <a:rPr lang="es-ES" dirty="0" smtClean="0"/>
+              <a:t>Una </a:t>
+            </a:r>
+            <a:r>
+              <a:rPr lang="es-ES" dirty="0"/>
+              <a:t>persona designada </a:t>
+            </a:r>
+            <a:r>
+              <a:rPr lang="es-ES" dirty="0" smtClean="0"/>
+              <a:t>por el </a:t>
+            </a:r>
+            <a:r>
+              <a:rPr lang="es-ES" dirty="0"/>
+              <a:t>Comité Técnico Estatal de la Administración Judicial Electrónica que agrupará a las entidades del ámbito judicial.</a:t>
+            </a:r>
+          </a:p>
+          <a:p>
+            <a:r>
+              <a:rPr lang="es-ES" dirty="0" smtClean="0"/>
+              <a:t>Las </a:t>
+            </a:r>
+            <a:r>
+              <a:rPr lang="es-ES" dirty="0"/>
+              <a:t>personas titulares de las Unidades responsables de accesibilidad de los demás entes obligados que no estén cubiertos por los </a:t>
+            </a:r>
+            <a:r>
+              <a:rPr lang="es-ES" dirty="0" smtClean="0"/>
+              <a:t>anteriores.</a:t>
+            </a:r>
+            <a:endParaRPr lang="es-ES" dirty="0"/>
           </a:p>
         </p:txBody>
       </p:sp>
@@ -15418,7 +15438,7 @@
     </p:spTree>
     <p:extLst>
       <p:ext uri="{BB962C8B-B14F-4D97-AF65-F5344CB8AC3E}">
-        <p14:creationId xmlns:p14="http://schemas.microsoft.com/office/powerpoint/2010/main" val="3134182807"/>
+        <p14:creationId xmlns:p14="http://schemas.microsoft.com/office/powerpoint/2010/main" val="1551768959"/>
       </p:ext>
     </p:extLst>
   </p:cSld>
@@ -15464,153 +15484,145 @@
         </p:nvSpPr>
         <p:spPr/>
         <p:txBody>
-          <a:bodyPr/>
-          <a:lstStyle/>
-          <a:p>
-            <a:r>
-              <a:rPr lang="es-ES" dirty="0" smtClean="0"/>
-              <a:t>8. </a:t>
-            </a:r>
-            <a:r>
-              <a:rPr lang="es-ES" dirty="0"/>
-              <a:t>Unidades responsables de </a:t>
+          <a:bodyPr>
+            <a:normAutofit fontScale="90000"/>
+          </a:bodyPr>
+          <a:lstStyle/>
+          <a:p>
+            <a:r>
+              <a:rPr lang="es-ES" dirty="0"/>
+              <a:t>Accesibilidad de aplicaciones para dispositivos móviles aplicando el RD 1112/2018 y la Directiva (UE) 2016/2102</a:t>
+            </a:r>
+          </a:p>
+        </p:txBody>
+      </p:sp>
+      <p:sp>
+        <p:nvSpPr>
+          <p:cNvPr id="3" name="Marcador de contenido 2"/>
+          <p:cNvSpPr>
+            <a:spLocks noGrp="1"/>
+          </p:cNvSpPr>
+          <p:nvPr>
+            <p:ph idx="1"/>
+          </p:nvPr>
+        </p:nvSpPr>
+        <p:spPr/>
+        <p:txBody>
+          <a:bodyPr>
+            <a:normAutofit fontScale="92500" lnSpcReduction="20000"/>
+          </a:bodyPr>
+          <a:lstStyle/>
+          <a:p>
+            <a:pPr marL="514350" indent="-514350">
+              <a:buFont typeface="+mj-lt"/>
+              <a:buAutoNum type="arabicPeriod"/>
+            </a:pPr>
+            <a:r>
+              <a:rPr lang="es-ES" dirty="0" smtClean="0"/>
+              <a:t>Objeto del RD 112/2018</a:t>
+            </a:r>
+          </a:p>
+          <a:p>
+            <a:pPr marL="514350" indent="-514350">
+              <a:buFont typeface="+mj-lt"/>
+              <a:buAutoNum type="arabicPeriod"/>
+            </a:pPr>
+            <a:r>
+              <a:rPr lang="es-ES" dirty="0" smtClean="0"/>
+              <a:t>Plazos</a:t>
+            </a:r>
+          </a:p>
+          <a:p>
+            <a:pPr marL="514350" indent="-514350">
+              <a:buFont typeface="+mj-lt"/>
+              <a:buAutoNum type="arabicPeriod"/>
+            </a:pPr>
+            <a:r>
+              <a:rPr lang="es-ES" dirty="0" smtClean="0"/>
+              <a:t>Mecanismos de comunicación de los usuarios</a:t>
+            </a:r>
+          </a:p>
+          <a:p>
+            <a:pPr marL="514350" indent="-514350">
+              <a:buFont typeface="+mj-lt"/>
+              <a:buAutoNum type="arabicPeriod"/>
+            </a:pPr>
+            <a:r>
+              <a:rPr lang="es-ES" dirty="0" smtClean="0"/>
+              <a:t>Revisiones de accesibilidad</a:t>
+            </a:r>
+          </a:p>
+          <a:p>
+            <a:pPr marL="514350" indent="-514350">
+              <a:buFont typeface="+mj-lt"/>
+              <a:buAutoNum type="arabicPeriod"/>
+            </a:pPr>
+            <a:r>
+              <a:rPr lang="es-ES" dirty="0" smtClean="0"/>
+              <a:t>Estándares de aplicación</a:t>
+            </a:r>
+          </a:p>
+          <a:p>
+            <a:pPr marL="514350" indent="-514350">
+              <a:buFont typeface="+mj-lt"/>
+              <a:buAutoNum type="arabicPeriod"/>
+            </a:pPr>
+            <a:r>
+              <a:rPr lang="es-ES" dirty="0"/>
+              <a:t>Modelo de </a:t>
+            </a:r>
+            <a:r>
+              <a:rPr lang="es-ES" dirty="0" smtClean="0"/>
+              <a:t>declaración </a:t>
+            </a:r>
+            <a:r>
+              <a:rPr lang="es-ES" dirty="0"/>
+              <a:t>de </a:t>
             </a:r>
             <a:r>
               <a:rPr lang="es-ES" dirty="0" smtClean="0"/>
               <a:t>accesibilidad</a:t>
             </a:r>
-            <a:br>
-              <a:rPr lang="es-ES" dirty="0" smtClean="0"/>
-            </a:br>
-            <a:r>
-              <a:rPr lang="es-ES" dirty="0" smtClean="0"/>
-              <a:t>Red de contactos</a:t>
-            </a:r>
-            <a:endParaRPr lang="es-ES" dirty="0"/>
-          </a:p>
-        </p:txBody>
-      </p:sp>
-      <p:sp>
-        <p:nvSpPr>
-          <p:cNvPr id="3" name="Marcador de contenido 2"/>
-          <p:cNvSpPr>
-            <a:spLocks noGrp="1"/>
-          </p:cNvSpPr>
-          <p:nvPr>
-            <p:ph idx="1"/>
-          </p:nvPr>
-        </p:nvSpPr>
-        <p:spPr/>
-        <p:txBody>
-          <a:bodyPr>
-            <a:normAutofit fontScale="77500" lnSpcReduction="20000"/>
-          </a:bodyPr>
-          <a:lstStyle/>
-          <a:p>
-            <a:pPr marL="0" indent="0">
-              <a:buNone/>
+          </a:p>
+          <a:p>
+            <a:pPr marL="514350" indent="-514350">
+              <a:buFont typeface="+mj-lt"/>
+              <a:buAutoNum type="arabicPeriod"/>
             </a:pPr>
             <a:r>
-              <a:rPr lang="es-ES" dirty="0" smtClean="0"/>
-              <a:t>Art. 20</a:t>
-            </a:r>
-            <a:r>
-              <a:rPr lang="es-ES" dirty="0"/>
-              <a:t>. Se crea la Red de Contactos de Accesibilidad Digital de las Administraciones Públicas con funciones de asistencia al Ministerio de Política Territorial y Función </a:t>
-            </a:r>
-            <a:r>
-              <a:rPr lang="es-ES" dirty="0" smtClean="0"/>
-              <a:t>Pública, compuesta por:</a:t>
-            </a:r>
-          </a:p>
-          <a:p>
-            <a:r>
-              <a:rPr lang="es-ES" dirty="0"/>
-              <a:t>Las personas titulares de las Unidades responsables de </a:t>
-            </a:r>
-            <a:r>
-              <a:rPr lang="es-ES" dirty="0" smtClean="0"/>
-              <a:t>accesibilidad de </a:t>
-            </a:r>
-            <a:r>
-              <a:rPr lang="es-ES" dirty="0"/>
-              <a:t>la </a:t>
-            </a:r>
-            <a:r>
-              <a:rPr lang="es-ES" dirty="0" smtClean="0"/>
-              <a:t>AGE y CCAA.</a:t>
-            </a:r>
-            <a:endParaRPr lang="es-ES" dirty="0"/>
-          </a:p>
-          <a:p>
-            <a:r>
-              <a:rPr lang="es-ES" dirty="0" smtClean="0"/>
-              <a:t>Al </a:t>
-            </a:r>
-            <a:r>
-              <a:rPr lang="es-ES" dirty="0"/>
-              <a:t>menos un punto de contacto provincial que agrupará a las entidades locales de esa </a:t>
-            </a:r>
-            <a:r>
-              <a:rPr lang="es-ES" dirty="0" smtClean="0"/>
-              <a:t>provincia.</a:t>
-            </a:r>
-            <a:endParaRPr lang="es-ES" dirty="0"/>
-          </a:p>
-          <a:p>
-            <a:r>
-              <a:rPr lang="es-ES" dirty="0" smtClean="0"/>
-              <a:t>Una </a:t>
-            </a:r>
-            <a:r>
-              <a:rPr lang="es-ES" dirty="0"/>
-              <a:t>persona </a:t>
-            </a:r>
-            <a:r>
-              <a:rPr lang="es-ES" dirty="0" smtClean="0"/>
-              <a:t>designada por la </a:t>
-            </a:r>
-            <a:r>
-              <a:rPr lang="es-ES" dirty="0"/>
-              <a:t>Conferencia de Rectores para las Universidades </a:t>
-            </a:r>
-            <a:r>
-              <a:rPr lang="es-ES" dirty="0" smtClean="0"/>
-              <a:t>españolas.</a:t>
-            </a:r>
-            <a:endParaRPr lang="es-ES" dirty="0"/>
-          </a:p>
-          <a:p>
-            <a:r>
-              <a:rPr lang="es-ES" dirty="0" smtClean="0"/>
-              <a:t>Una </a:t>
-            </a:r>
-            <a:r>
-              <a:rPr lang="es-ES" dirty="0"/>
-              <a:t>persona designada </a:t>
-            </a:r>
-            <a:r>
-              <a:rPr lang="es-ES" dirty="0" smtClean="0"/>
-              <a:t>por el </a:t>
-            </a:r>
-            <a:r>
-              <a:rPr lang="es-ES" dirty="0"/>
-              <a:t>Comité Técnico Estatal de la Administración Judicial Electrónica que agrupará a las entidades del ámbito judicial.</a:t>
-            </a:r>
-          </a:p>
-          <a:p>
-            <a:r>
-              <a:rPr lang="es-ES" dirty="0" smtClean="0"/>
-              <a:t>Las </a:t>
-            </a:r>
-            <a:r>
-              <a:rPr lang="es-ES" dirty="0"/>
-              <a:t>personas titulares de las Unidades responsables de accesibilidad de los demás entes obligados que no estén cubiertos por los </a:t>
-            </a:r>
-            <a:r>
-              <a:rPr lang="es-ES" dirty="0" smtClean="0"/>
-              <a:t>anteriores.</a:t>
-            </a:r>
+              <a:rPr lang="es-ES" dirty="0"/>
+              <a:t>Seguimiento y presentación de </a:t>
+            </a:r>
+            <a:r>
+              <a:rPr lang="es-ES" dirty="0" smtClean="0"/>
+              <a:t>informes</a:t>
+            </a:r>
+          </a:p>
+          <a:p>
+            <a:pPr marL="514350" indent="-514350">
+              <a:buFont typeface="+mj-lt"/>
+              <a:buAutoNum type="arabicPeriod"/>
+            </a:pPr>
+            <a:r>
+              <a:rPr lang="es-ES" dirty="0" smtClean="0"/>
+              <a:t>Unidades responsables de accesibilidad</a:t>
+            </a:r>
+          </a:p>
+          <a:p>
+            <a:pPr marL="514350" indent="-514350">
+              <a:buFont typeface="+mj-lt"/>
+              <a:buAutoNum type="arabicPeriod"/>
+            </a:pPr>
+            <a:r>
+              <a:rPr lang="es-ES" dirty="0"/>
+              <a:t>Futura legislación: Directiva (UE) </a:t>
+            </a:r>
+            <a:r>
+              <a:rPr lang="es-ES" dirty="0" smtClean="0"/>
+              <a:t>2019/882</a:t>
+            </a:r>
+          </a:p>
+          <a:p>
             <a:endParaRPr lang="es-ES" dirty="0"/>
           </a:p>
         </p:txBody>
@@ -15638,10 +15650,50 @@
           </a:p>
         </p:txBody>
       </p:sp>
+      <p:sp>
+        <p:nvSpPr>
+          <p:cNvPr id="5" name="Flecha derecha 4" title="&quot;&quot;"/>
+          <p:cNvSpPr/>
+          <p:nvPr/>
+        </p:nvSpPr>
+        <p:spPr>
+          <a:xfrm>
+            <a:off x="665220" y="5775948"/>
+            <a:ext cx="487018" cy="278296"/>
+          </a:xfrm>
+          <a:prstGeom prst="rightArrow">
+            <a:avLst/>
+          </a:prstGeom>
+        </p:spPr>
+        <p:style>
+          <a:lnRef idx="2">
+            <a:schemeClr val="accent1">
+              <a:shade val="50000"/>
+            </a:schemeClr>
+          </a:lnRef>
+          <a:fillRef idx="1">
+            <a:schemeClr val="accent1"/>
+          </a:fillRef>
+          <a:effectRef idx="0">
+            <a:schemeClr val="accent1"/>
+          </a:effectRef>
+          <a:fontRef idx="minor">
+            <a:schemeClr val="lt1"/>
+          </a:fontRef>
+        </p:style>
+        <p:txBody>
+          <a:bodyPr rtlCol="0" anchor="ctr"/>
+          <a:lstStyle/>
+          <a:p>
+            <a:pPr algn="ctr"/>
+            <a:endParaRPr lang="es-ES"/>
+          </a:p>
+        </p:txBody>
+      </p:sp>
     </p:spTree>
     <p:extLst>
       <p:ext uri="{BB962C8B-B14F-4D97-AF65-F5344CB8AC3E}">
-        <p14:creationId xmlns:p14="http://schemas.microsoft.com/office/powerpoint/2010/main" val="1551768959"/>
+        <p14:creationId xmlns:p14="http://schemas.microsoft.com/office/powerpoint/2010/main" val="3169276082"/>
       </p:ext>
     </p:extLst>
   </p:cSld>
@@ -15942,96 +15994,62 @@
         </p:nvSpPr>
         <p:spPr/>
         <p:txBody>
+          <a:bodyPr/>
+          <a:lstStyle/>
+          <a:p>
+            <a:r>
+              <a:rPr lang="es-ES" dirty="0" smtClean="0"/>
+              <a:t>9. Futura legislación: Directiva </a:t>
+            </a:r>
+            <a:r>
+              <a:rPr lang="es-ES" dirty="0"/>
+              <a:t>(UE) </a:t>
+            </a:r>
+            <a:r>
+              <a:rPr lang="es-ES" dirty="0" smtClean="0"/>
+              <a:t>2019/882</a:t>
+            </a:r>
+            <a:endParaRPr lang="es-ES" dirty="0"/>
+          </a:p>
+        </p:txBody>
+      </p:sp>
+      <p:sp>
+        <p:nvSpPr>
+          <p:cNvPr id="3" name="Marcador de contenido 2"/>
+          <p:cNvSpPr>
+            <a:spLocks noGrp="1"/>
+          </p:cNvSpPr>
+          <p:nvPr>
+            <p:ph idx="1"/>
+          </p:nvPr>
+        </p:nvSpPr>
+        <p:spPr/>
+        <p:txBody>
           <a:bodyPr>
-            <a:normAutofit fontScale="90000"/>
+            <a:normAutofit fontScale="85000" lnSpcReduction="20000"/>
           </a:bodyPr>
           <a:lstStyle/>
           <a:p>
             <a:r>
-              <a:rPr lang="es-ES" dirty="0"/>
-              <a:t>Accesibilidad de aplicaciones para dispositivos móviles aplicando el RD 1112/2018 y la Directiva (UE) 2016/2102</a:t>
-            </a:r>
-          </a:p>
-        </p:txBody>
-      </p:sp>
-      <p:sp>
-        <p:nvSpPr>
-          <p:cNvPr id="3" name="Marcador de contenido 2"/>
-          <p:cNvSpPr>
-            <a:spLocks noGrp="1"/>
-          </p:cNvSpPr>
-          <p:nvPr>
-            <p:ph idx="1"/>
-          </p:nvPr>
-        </p:nvSpPr>
-        <p:spPr/>
-        <p:txBody>
-          <a:bodyPr>
-            <a:normAutofit fontScale="92500" lnSpcReduction="20000"/>
-          </a:bodyPr>
-          <a:lstStyle/>
-          <a:p>
-            <a:pPr marL="514350" indent="-514350">
-              <a:buFont typeface="+mj-lt"/>
-              <a:buAutoNum type="arabicPeriod"/>
-            </a:pPr>
-            <a:r>
-              <a:rPr lang="es-ES" dirty="0" smtClean="0"/>
-              <a:t>Objeto del RD 112/2018</a:t>
-            </a:r>
-          </a:p>
-          <a:p>
-            <a:pPr marL="514350" indent="-514350">
-              <a:buFont typeface="+mj-lt"/>
-              <a:buAutoNum type="arabicPeriod"/>
-            </a:pPr>
-            <a:r>
-              <a:rPr lang="es-ES" dirty="0" smtClean="0"/>
-              <a:t>Plazos</a:t>
-            </a:r>
-          </a:p>
-          <a:p>
-            <a:pPr marL="514350" indent="-514350">
-              <a:buFont typeface="+mj-lt"/>
-              <a:buAutoNum type="arabicPeriod"/>
-            </a:pPr>
-            <a:r>
-              <a:rPr lang="es-ES" dirty="0" smtClean="0"/>
-              <a:t>Mecanismos de comunicación de los usuarios</a:t>
-            </a:r>
-          </a:p>
-          <a:p>
-            <a:pPr marL="514350" indent="-514350">
-              <a:buFont typeface="+mj-lt"/>
-              <a:buAutoNum type="arabicPeriod"/>
-            </a:pPr>
-            <a:r>
-              <a:rPr lang="es-ES" dirty="0" smtClean="0"/>
-              <a:t>Revisiones de accesibilidad</a:t>
-            </a:r>
-          </a:p>
-          <a:p>
-            <a:pPr marL="514350" indent="-514350">
-              <a:buFont typeface="+mj-lt"/>
-              <a:buAutoNum type="arabicPeriod"/>
-            </a:pPr>
-            <a:r>
-              <a:rPr lang="es-ES" dirty="0" smtClean="0"/>
-              <a:t>Estándares de aplicación</a:t>
-            </a:r>
-          </a:p>
-          <a:p>
-            <a:pPr marL="514350" indent="-514350">
-              <a:buFont typeface="+mj-lt"/>
-              <a:buAutoNum type="arabicPeriod"/>
-            </a:pPr>
-            <a:r>
-              <a:rPr lang="es-ES" dirty="0"/>
-              <a:t>Modelo de </a:t>
-            </a:r>
-            <a:r>
-              <a:rPr lang="es-ES" dirty="0" smtClean="0"/>
-              <a:t>declaración </a:t>
+              <a:rPr lang="es-ES" dirty="0" smtClean="0"/>
+              <a:t>No es una directiva para Administraciones Públicas, sino de carácter general</a:t>
+            </a:r>
+          </a:p>
+          <a:p>
+            <a:r>
+              <a:rPr lang="es-ES" dirty="0" smtClean="0"/>
+              <a:t>Establece que en la UE deben ser accesibles, entre otros, las apps que ofrecen:</a:t>
+            </a:r>
+          </a:p>
+          <a:p>
+            <a:pPr lvl="1"/>
+            <a:r>
+              <a:rPr lang="es-ES" dirty="0"/>
+              <a:t>s</a:t>
+            </a:r>
+            <a:r>
+              <a:rPr lang="es-ES" dirty="0" smtClean="0"/>
+              <a:t>ervicios </a:t>
             </a:r>
             <a:r>
               <a:rPr lang="es-ES" dirty="0"/>
@@ -16039,49 +16057,76 @@
             </a:r>
             <a:r>
               <a:rPr lang="es-ES" dirty="0" smtClean="0"/>
-              <a:t>accesibilidad</a:t>
-            </a:r>
-          </a:p>
-          <a:p>
-            <a:pPr marL="514350" indent="-514350">
-              <a:buFont typeface="+mj-lt"/>
-              <a:buAutoNum type="arabicPeriod"/>
-            </a:pPr>
-            <a:r>
-              <a:rPr lang="es-ES" dirty="0"/>
-              <a:t>Seguimiento y presentación de </a:t>
-            </a:r>
-            <a:r>
-              <a:rPr lang="es-ES" dirty="0" smtClean="0"/>
-              <a:t>informes</a:t>
-            </a:r>
-          </a:p>
-          <a:p>
-            <a:pPr marL="514350" indent="-514350">
-              <a:buFont typeface="+mj-lt"/>
-              <a:buAutoNum type="arabicPeriod"/>
-            </a:pPr>
-            <a:r>
-              <a:rPr lang="es-ES" dirty="0" smtClean="0"/>
-              <a:t>Unidades responsables de accesibilidad</a:t>
-            </a:r>
-          </a:p>
-          <a:p>
-            <a:pPr marL="514350" indent="-514350">
-              <a:buFont typeface="+mj-lt"/>
-              <a:buAutoNum type="arabicPeriod"/>
-            </a:pPr>
-            <a:r>
-              <a:rPr lang="es-ES" dirty="0"/>
-              <a:t>Futura legislación: Directiva (UE) </a:t>
-            </a:r>
-            <a:r>
-              <a:rPr lang="es-ES" dirty="0" smtClean="0"/>
-              <a:t>2019/882</a:t>
-            </a:r>
-          </a:p>
-          <a:p>
+              <a:t>comunicaciones electrónicas</a:t>
+            </a:r>
+          </a:p>
+          <a:p>
+            <a:pPr lvl="1"/>
+            <a:r>
+              <a:rPr lang="es-ES" dirty="0"/>
+              <a:t>s</a:t>
+            </a:r>
+            <a:r>
+              <a:rPr lang="es-ES" dirty="0" smtClean="0"/>
+              <a:t>ervicios de comunicación audiovisual</a:t>
+            </a:r>
+          </a:p>
+          <a:p>
+            <a:pPr lvl="1"/>
+            <a:r>
+              <a:rPr lang="es-ES" dirty="0" smtClean="0"/>
+              <a:t>servicios </a:t>
+            </a:r>
+            <a:r>
+              <a:rPr lang="es-ES" dirty="0"/>
+              <a:t>de </a:t>
+            </a:r>
+            <a:r>
+              <a:rPr lang="es-ES" dirty="0" smtClean="0"/>
+              <a:t>transporte de viajeros</a:t>
+            </a:r>
+          </a:p>
+          <a:p>
+            <a:pPr lvl="1"/>
+            <a:r>
+              <a:rPr lang="es-ES" dirty="0"/>
+              <a:t>servicios bancarios para consumidores</a:t>
+            </a:r>
+          </a:p>
+          <a:p>
+            <a:pPr lvl="1"/>
+            <a:r>
+              <a:rPr lang="es-ES" dirty="0" smtClean="0"/>
+              <a:t>libros electrónicos</a:t>
+            </a:r>
+          </a:p>
+          <a:p>
+            <a:pPr lvl="1"/>
+            <a:r>
+              <a:rPr lang="es-ES" dirty="0" smtClean="0"/>
+              <a:t>servicios </a:t>
+            </a:r>
+            <a:r>
+              <a:rPr lang="es-ES" dirty="0"/>
+              <a:t>de comercio </a:t>
+            </a:r>
+            <a:r>
+              <a:rPr lang="es-ES" dirty="0" smtClean="0"/>
+              <a:t>electrónico</a:t>
+            </a:r>
             <a:endParaRPr lang="es-ES" dirty="0"/>
+          </a:p>
+          <a:p>
+            <a:r>
+              <a:rPr lang="es-ES" dirty="0" smtClean="0"/>
+              <a:t>Establece requisitos de accesibilidad generales, que se pueden satisfacer con EN 301549</a:t>
+            </a:r>
+          </a:p>
+          <a:p>
+            <a:r>
+              <a:rPr lang="es-ES" dirty="0" smtClean="0"/>
+              <a:t>Desde el 28 de junio de 2025 deben ser accesibles las nuevas apps</a:t>
+            </a:r>
           </a:p>
         </p:txBody>
       </p:sp>
@@ -16108,50 +16153,10 @@
           </a:p>
         </p:txBody>
       </p:sp>
-      <p:sp>
-        <p:nvSpPr>
-          <p:cNvPr id="5" name="Flecha derecha 4" title="&quot;&quot;"/>
-          <p:cNvSpPr/>
-          <p:nvPr/>
-        </p:nvSpPr>
-        <p:spPr>
-          <a:xfrm>
-            <a:off x="665220" y="5775948"/>
-            <a:ext cx="487018" cy="278296"/>
-          </a:xfrm>
-          <a:prstGeom prst="rightArrow">
-            <a:avLst/>
-          </a:prstGeom>
-        </p:spPr>
-        <p:style>
-          <a:lnRef idx="2">
-            <a:schemeClr val="accent1">
-              <a:shade val="50000"/>
-            </a:schemeClr>
-          </a:lnRef>
-          <a:fillRef idx="1">
-            <a:schemeClr val="accent1"/>
-          </a:fillRef>
-          <a:effectRef idx="0">
-            <a:schemeClr val="accent1"/>
-          </a:effectRef>
-          <a:fontRef idx="minor">
-            <a:schemeClr val="lt1"/>
-          </a:fontRef>
-        </p:style>
-        <p:txBody>
-          <a:bodyPr rtlCol="0" anchor="ctr"/>
-          <a:lstStyle/>
-          <a:p>
-            <a:pPr algn="ctr"/>
-            <a:endParaRPr lang="es-ES"/>
-          </a:p>
-        </p:txBody>
-      </p:sp>
     </p:spTree>
     <p:extLst>
       <p:ext uri="{BB962C8B-B14F-4D97-AF65-F5344CB8AC3E}">
-        <p14:creationId xmlns:p14="http://schemas.microsoft.com/office/powerpoint/2010/main" val="3169276082"/>
+        <p14:creationId xmlns:p14="http://schemas.microsoft.com/office/powerpoint/2010/main" val="198671647"/>
       </p:ext>
     </p:extLst>
   </p:cSld>
@@ -16202,15 +16207,7 @@
           <a:p>
             <a:r>
               <a:rPr lang="es-ES" dirty="0" smtClean="0"/>
-              <a:t>9. Futura legislación: Directiva </a:t>
-            </a:r>
-            <a:r>
-              <a:rPr lang="es-ES" dirty="0"/>
-              <a:t>(UE) </a:t>
-            </a:r>
-            <a:r>
-              <a:rPr lang="es-ES" dirty="0" smtClean="0"/>
-              <a:t>2019/882</a:t>
+              <a:t>Conclusiones</a:t>
             </a:r>
             <a:endParaRPr lang="es-ES" dirty="0"/>
           </a:p>
@@ -16235,101 +16232,132 @@
           <a:p>
             <a:r>
               <a:rPr lang="es-ES" dirty="0" smtClean="0"/>
-              <a:t>No es una directiva para Administraciones Públicas, sino de carácter general</a:t>
-            </a:r>
-          </a:p>
-          <a:p>
-            <a:r>
-              <a:rPr lang="es-ES" dirty="0" smtClean="0"/>
-              <a:t>Establece que en la UE deben ser accesibles, entre otros, las apps que ofrecen:</a:t>
-            </a:r>
+              <a:t>Todas las apps de las Administraciones Públicas en la Unión Europea deben ser </a:t>
+            </a:r>
+            <a:r>
+              <a:rPr lang="es-ES" dirty="0"/>
+              <a:t>accesibles antes </a:t>
+            </a:r>
+            <a:r>
+              <a:rPr lang="es-ES" dirty="0" smtClean="0"/>
+              <a:t>del 23 </a:t>
+            </a:r>
+            <a:r>
+              <a:rPr lang="es-ES" dirty="0"/>
+              <a:t>de junio de </a:t>
+            </a:r>
+            <a:r>
+              <a:rPr lang="es-ES" dirty="0" smtClean="0"/>
+              <a:t>2021</a:t>
+            </a:r>
+          </a:p>
+          <a:p>
+            <a:r>
+              <a:rPr lang="es-ES" dirty="0" smtClean="0"/>
+              <a:t>Otras apps de sectores como el comercio electrónico o el transporte de viajeros deben ser accesibles desde el 28 de junio de 2025</a:t>
+            </a:r>
+          </a:p>
+          <a:p>
+            <a:r>
+              <a:rPr lang="es-ES" dirty="0"/>
+              <a:t>H</a:t>
+            </a:r>
+            <a:r>
+              <a:rPr lang="es-ES" dirty="0" smtClean="0"/>
+              <a:t>abrá </a:t>
+            </a:r>
+            <a:r>
+              <a:rPr lang="es-ES" dirty="0" smtClean="0"/>
+              <a:t>que evaluar la accesibilidad de </a:t>
+            </a:r>
+            <a:r>
+              <a:rPr lang="es-ES" dirty="0" smtClean="0"/>
+              <a:t>las apps </a:t>
+            </a:r>
+            <a:r>
+              <a:rPr lang="es-ES" dirty="0" smtClean="0"/>
+              <a:t>de </a:t>
+            </a:r>
+            <a:r>
+              <a:rPr lang="es-ES" dirty="0" smtClean="0"/>
+              <a:t>las Administraciones </a:t>
+            </a:r>
+            <a:r>
+              <a:rPr lang="es-ES" dirty="0" smtClean="0"/>
+              <a:t>Públicas </a:t>
+            </a:r>
+            <a:r>
+              <a:rPr lang="es-ES" dirty="0" smtClean="0"/>
+              <a:t>todos los años, y cada </a:t>
+            </a:r>
+            <a:r>
+              <a:rPr lang="es-ES" dirty="0" smtClean="0"/>
+              <a:t>3 años </a:t>
+            </a:r>
+            <a:r>
+              <a:rPr lang="es-ES" dirty="0" smtClean="0"/>
+              <a:t>presentar un informe conjunto a </a:t>
+            </a:r>
+            <a:r>
+              <a:rPr lang="es-ES" dirty="0" smtClean="0"/>
+              <a:t>la </a:t>
+            </a:r>
+            <a:r>
+              <a:rPr lang="es-ES" dirty="0" smtClean="0"/>
+              <a:t>Unión Europea sobre la accesibilidad en ese periodo de un número de apps que depende </a:t>
+            </a:r>
+            <a:r>
+              <a:rPr lang="es-ES" dirty="0" smtClean="0"/>
+              <a:t>de la cantidad de habitantes del país</a:t>
+            </a:r>
+            <a:endParaRPr lang="es-ES" dirty="0"/>
           </a:p>
           <a:p>
             <a:pPr lvl="1"/>
             <a:r>
-              <a:rPr lang="es-ES" dirty="0"/>
-              <a:t>s</a:t>
-            </a:r>
-            <a:r>
-              <a:rPr lang="es-ES" dirty="0" smtClean="0"/>
-              <a:t>ervicios </a:t>
-            </a:r>
-            <a:r>
-              <a:rPr lang="es-ES" dirty="0"/>
-              <a:t>de </a:t>
-            </a:r>
-            <a:r>
-              <a:rPr lang="es-ES" dirty="0" smtClean="0"/>
-              <a:t>comunicaciones electrónicas</a:t>
-            </a:r>
-          </a:p>
-          <a:p>
-            <a:pPr lvl="1"/>
-            <a:r>
-              <a:rPr lang="es-ES" dirty="0"/>
-              <a:t>s</a:t>
-            </a:r>
-            <a:r>
-              <a:rPr lang="es-ES" dirty="0" smtClean="0"/>
-              <a:t>ervicios de comunicación audiovisual</a:t>
-            </a:r>
-          </a:p>
-          <a:p>
-            <a:pPr lvl="1"/>
-            <a:r>
-              <a:rPr lang="es-ES" dirty="0" smtClean="0"/>
-              <a:t>servicios </a:t>
-            </a:r>
-            <a:r>
-              <a:rPr lang="es-ES" dirty="0"/>
-              <a:t>de </a:t>
-            </a:r>
-            <a:r>
-              <a:rPr lang="es-ES" dirty="0" smtClean="0"/>
-              <a:t>transporte de viajeros</a:t>
-            </a:r>
-          </a:p>
-          <a:p>
-            <a:pPr lvl="1"/>
-            <a:r>
-              <a:rPr lang="es-ES" dirty="0"/>
-              <a:t>servicios bancarios para consumidores</a:t>
-            </a:r>
-          </a:p>
-          <a:p>
-            <a:pPr lvl="1"/>
-            <a:r>
-              <a:rPr lang="es-ES" dirty="0" smtClean="0"/>
-              <a:t>libros electrónicos</a:t>
-            </a:r>
-          </a:p>
-          <a:p>
-            <a:pPr lvl="1"/>
-            <a:r>
-              <a:rPr lang="es-ES" dirty="0" smtClean="0"/>
-              <a:t>servicios </a:t>
-            </a:r>
-            <a:r>
-              <a:rPr lang="es-ES" dirty="0"/>
-              <a:t>de comercio </a:t>
-            </a:r>
-            <a:r>
-              <a:rPr lang="es-ES" dirty="0" smtClean="0"/>
-              <a:t>electrónico</a:t>
-            </a:r>
+              <a:rPr lang="es-ES" dirty="0" smtClean="0"/>
+              <a:t>El primer informe debe presentarse el 23 de diciembre de 2021 y es excepcional, pues sólo cubre </a:t>
+            </a:r>
+            <a:r>
+              <a:rPr lang="es-ES" smtClean="0"/>
+              <a:t>evaluaciones desde el 23 de junio de 2021 y debe incluir sólo 1/3 </a:t>
+            </a:r>
+            <a:r>
+              <a:rPr lang="es-ES" dirty="0" smtClean="0"/>
+              <a:t>de las apps que se exigirán en los siguientes informes </a:t>
+            </a:r>
+            <a:r>
+              <a:rPr lang="es-ES" dirty="0" err="1" smtClean="0"/>
+              <a:t>tri</a:t>
+            </a:r>
+            <a:r>
+              <a:rPr lang="es-ES" dirty="0" smtClean="0"/>
+              <a:t>-anuales </a:t>
+            </a:r>
+          </a:p>
+          <a:p>
+            <a:r>
+              <a:rPr lang="es-ES" dirty="0" smtClean="0"/>
+              <a:t>La </a:t>
+            </a:r>
+            <a:r>
+              <a:rPr lang="es-ES" dirty="0" smtClean="0"/>
+              <a:t>evaluación de la accesibilidad de las apps se realiza aplicando </a:t>
+            </a:r>
+            <a:r>
+              <a:rPr lang="es-ES" dirty="0"/>
+              <a:t>la norma EN </a:t>
+            </a:r>
+            <a:r>
+              <a:rPr lang="es-ES" dirty="0" smtClean="0"/>
+              <a:t>301549 </a:t>
+            </a:r>
+          </a:p>
+          <a:p>
             <a:endParaRPr lang="es-ES" dirty="0"/>
           </a:p>
           <a:p>
-            <a:r>
-              <a:rPr lang="es-ES" dirty="0" smtClean="0"/>
-              <a:t>Establece requisitos de accesibilidad generales, que se pueden satisfacer con EN 301549</a:t>
-            </a:r>
-          </a:p>
-          <a:p>
-            <a:r>
-              <a:rPr lang="es-ES" dirty="0" smtClean="0"/>
-              <a:t>Desde el 28 de junio de 2025 deben ser accesibles las nuevas apps</a:t>
-            </a:r>
+            <a:endParaRPr lang="es-ES" dirty="0"/>
           </a:p>
         </p:txBody>
       </p:sp>
@@ -16351,166 +16379,6 @@
             <a:fld id="{C9400CC4-AA0F-4E2E-A7D9-25BF1D2A8A65}" type="slidenum">
               <a:rPr lang="es-ES" smtClean="0"/>
               <a:t>41</a:t>
-            </a:fld>
-            <a:endParaRPr lang="es-ES" dirty="0"/>
-          </a:p>
-        </p:txBody>
-      </p:sp>
-    </p:spTree>
-    <p:extLst>
-      <p:ext uri="{BB962C8B-B14F-4D97-AF65-F5344CB8AC3E}">
-        <p14:creationId xmlns:p14="http://schemas.microsoft.com/office/powerpoint/2010/main" val="198671647"/>
-      </p:ext>
-    </p:extLst>
-  </p:cSld>
-  <p:clrMapOvr>
-    <a:masterClrMapping/>
-  </p:clrMapOvr>
-  <p:timing>
-    <p:tnLst>
-      <p:par>
-        <p:cTn id="1" dur="indefinite" restart="never" nodeType="tmRoot"/>
-      </p:par>
-    </p:tnLst>
-  </p:timing>
-</p:sld>
-</file>
-
-<file path=ppt/slides/slide42.xml><?xml version="1.0" encoding="utf-8"?>
-<p:sld xmlns:a="http://schemas.openxmlformats.org/drawingml/2006/main" xmlns:r="http://schemas.openxmlformats.org/officeDocument/2006/relationships" xmlns:p="http://schemas.openxmlformats.org/presentationml/2006/main">
-  <p:cSld>
-    <p:spTree>
-      <p:nvGrpSpPr>
-        <p:cNvPr id="1" name=""/>
-        <p:cNvGrpSpPr/>
-        <p:nvPr/>
-      </p:nvGrpSpPr>
-      <p:grpSpPr>
-        <a:xfrm>
-          <a:off x="0" y="0"/>
-          <a:ext cx="0" cy="0"/>
-          <a:chOff x="0" y="0"/>
-          <a:chExt cx="0" cy="0"/>
-        </a:xfrm>
-      </p:grpSpPr>
-      <p:sp>
-        <p:nvSpPr>
-          <p:cNvPr id="2" name="Título 1"/>
-          <p:cNvSpPr>
-            <a:spLocks noGrp="1"/>
-          </p:cNvSpPr>
-          <p:nvPr>
-            <p:ph type="title"/>
-          </p:nvPr>
-        </p:nvSpPr>
-        <p:spPr/>
-        <p:txBody>
-          <a:bodyPr/>
-          <a:lstStyle/>
-          <a:p>
-            <a:r>
-              <a:rPr lang="es-ES" dirty="0" smtClean="0"/>
-              <a:t>Conclusiones</a:t>
-            </a:r>
-            <a:endParaRPr lang="es-ES" dirty="0"/>
-          </a:p>
-        </p:txBody>
-      </p:sp>
-      <p:sp>
-        <p:nvSpPr>
-          <p:cNvPr id="3" name="Marcador de contenido 2"/>
-          <p:cNvSpPr>
-            <a:spLocks noGrp="1"/>
-          </p:cNvSpPr>
-          <p:nvPr>
-            <p:ph idx="1"/>
-          </p:nvPr>
-        </p:nvSpPr>
-        <p:spPr/>
-        <p:txBody>
-          <a:bodyPr>
-            <a:normAutofit fontScale="92500" lnSpcReduction="10000"/>
-          </a:bodyPr>
-          <a:lstStyle/>
-          <a:p>
-            <a:r>
-              <a:rPr lang="es-ES" dirty="0" smtClean="0"/>
-              <a:t>Todas las apps de las Administraciones Públicas en la Unión Europea deben ser </a:t>
-            </a:r>
-            <a:r>
-              <a:rPr lang="es-ES" dirty="0"/>
-              <a:t>accesibles antes </a:t>
-            </a:r>
-            <a:r>
-              <a:rPr lang="es-ES" dirty="0" smtClean="0"/>
-              <a:t>del 23 </a:t>
-            </a:r>
-            <a:r>
-              <a:rPr lang="es-ES" dirty="0"/>
-              <a:t>de junio de </a:t>
-            </a:r>
-            <a:r>
-              <a:rPr lang="es-ES" dirty="0" smtClean="0"/>
-              <a:t>2021</a:t>
-            </a:r>
-          </a:p>
-          <a:p>
-            <a:r>
-              <a:rPr lang="es-ES" dirty="0" smtClean="0"/>
-              <a:t>Otras apps de sectores como el comercio electrónico o el transporte de viajeros deben ser accesibles desde el 28 de junio de 2025</a:t>
-            </a:r>
-          </a:p>
-          <a:p>
-            <a:r>
-              <a:rPr lang="es-ES" dirty="0" smtClean="0"/>
-              <a:t>En España habrá que evaluar la accesibilidad de 52 apps de Administraciones Públicas cada 3 años y presentar informes a la CCEE desde el 23 de diciembre </a:t>
-            </a:r>
-            <a:r>
-              <a:rPr lang="es-ES" smtClean="0"/>
-              <a:t>de 2021 </a:t>
-            </a:r>
-            <a:endParaRPr lang="es-ES" dirty="0" smtClean="0"/>
-          </a:p>
-          <a:p>
-            <a:r>
-              <a:rPr lang="es-ES" dirty="0" smtClean="0"/>
-              <a:t>La evaluación de la accesibilidad de las apps se realiza aplicando </a:t>
-            </a:r>
-            <a:r>
-              <a:rPr lang="es-ES" dirty="0"/>
-              <a:t>la norma EN </a:t>
-            </a:r>
-            <a:r>
-              <a:rPr lang="es-ES" dirty="0" smtClean="0"/>
-              <a:t>301549 </a:t>
-            </a:r>
-          </a:p>
-          <a:p>
-            <a:endParaRPr lang="es-ES" dirty="0"/>
-          </a:p>
-          <a:p>
-            <a:endParaRPr lang="es-ES" dirty="0"/>
-          </a:p>
-        </p:txBody>
-      </p:sp>
-      <p:sp>
-        <p:nvSpPr>
-          <p:cNvPr id="4" name="Marcador de número de diapositiva 3"/>
-          <p:cNvSpPr>
-            <a:spLocks noGrp="1"/>
-          </p:cNvSpPr>
-          <p:nvPr>
-            <p:ph type="sldNum" sz="quarter" idx="12"/>
-          </p:nvPr>
-        </p:nvSpPr>
-        <p:spPr/>
-        <p:txBody>
-          <a:bodyPr/>
-          <a:lstStyle/>
-          <a:p>
-            <a:fld id="{C9400CC4-AA0F-4E2E-A7D9-25BF1D2A8A65}" type="slidenum">
-              <a:rPr lang="es-ES" smtClean="0"/>
-              <a:t>42</a:t>
             </a:fld>
             <a:endParaRPr lang="es-ES" dirty="0"/>
           </a:p>

</xml_diff>